<commit_message>
Update UG/DG for Templates (#217)
</commit_message>
<xml_diff>
--- a/docs/diagrams/HighLevelSequenceDiagrams.pptx
+++ b/docs/diagrams/HighLevelSequenceDiagrams.pptx
@@ -5,10 +5,12 @@
     <p:sldMasterId id="2147483648" r:id="rId1"/>
   </p:sldMasterIdLst>
   <p:notesMasterIdLst>
-    <p:notesMasterId r:id="rId3"/>
+    <p:notesMasterId r:id="rId5"/>
   </p:notesMasterIdLst>
   <p:sldIdLst>
     <p:sldId id="266" r:id="rId2"/>
+    <p:sldId id="267" r:id="rId3"/>
+    <p:sldId id="268" r:id="rId4"/>
   </p:sldIdLst>
   <p:sldSz cx="9144000" cy="6858000" type="screen4x3"/>
   <p:notesSz cx="6858000" cy="9144000"/>
@@ -107,6 +109,22 @@
       </a:defRPr>
     </a:lvl9pPr>
   </p:defaultTextStyle>
+  <p:extLst>
+    <p:ext uri="{EFAFB233-063F-42B5-8137-9DF3F51BA10A}">
+      <p15:sldGuideLst xmlns:p15="http://schemas.microsoft.com/office/powerpoint/2012/main">
+        <p15:guide id="1" orient="horz" pos="1488">
+          <p15:clr>
+            <a:srgbClr val="A4A3A4"/>
+          </p15:clr>
+        </p15:guide>
+        <p15:guide id="2" pos="2880">
+          <p15:clr>
+            <a:srgbClr val="A4A3A4"/>
+          </p15:clr>
+        </p15:guide>
+      </p15:sldGuideLst>
+    </p:ext>
+  </p:extLst>
 </p:presentation>
 </file>
 
@@ -192,7 +210,7 @@
           <a:p>
             <a:fld id="{F5CC4B3F-88C1-4FFA-B1B6-F41C21DC6924}" type="datetimeFigureOut">
               <a:rPr lang="en-US" smtClean="0"/>
-              <a:t>10/16/2016</a:t>
+              <a:t>10/30/2018</a:t>
             </a:fld>
             <a:endParaRPr lang="en-US"/>
           </a:p>
@@ -256,38 +274,37 @@
           <a:p>
             <a:pPr lvl="0"/>
             <a:r>
-              <a:rPr lang="en-US" smtClean="0"/>
+              <a:rPr lang="en-US"/>
               <a:t>Click to edit Master text styles</a:t>
             </a:r>
           </a:p>
           <a:p>
             <a:pPr lvl="1"/>
             <a:r>
-              <a:rPr lang="en-US" smtClean="0"/>
+              <a:rPr lang="en-US"/>
               <a:t>Second level</a:t>
             </a:r>
           </a:p>
           <a:p>
             <a:pPr lvl="2"/>
             <a:r>
-              <a:rPr lang="en-US" smtClean="0"/>
+              <a:rPr lang="en-US"/>
               <a:t>Third level</a:t>
             </a:r>
           </a:p>
           <a:p>
             <a:pPr lvl="3"/>
             <a:r>
-              <a:rPr lang="en-US" smtClean="0"/>
+              <a:rPr lang="en-US"/>
               <a:t>Fourth level</a:t>
             </a:r>
           </a:p>
           <a:p>
             <a:pPr lvl="4"/>
             <a:r>
-              <a:rPr lang="en-US" smtClean="0"/>
+              <a:rPr lang="en-US"/>
               <a:t>Fifth level</a:t>
             </a:r>
-            <a:endParaRPr lang="en-US"/>
           </a:p>
         </p:txBody>
       </p:sp>
@@ -498,10 +515,9 @@
           <a:lstStyle/>
           <a:p>
             <a:r>
-              <a:rPr lang="en-US" smtClean="0"/>
+              <a:rPr lang="en-US"/>
               <a:t>Click to edit Master title style</a:t>
             </a:r>
-            <a:endParaRPr lang="en-US"/>
           </a:p>
         </p:txBody>
       </p:sp>
@@ -617,10 +633,9 @@
           </a:lstStyle>
           <a:p>
             <a:r>
-              <a:rPr lang="en-US" smtClean="0"/>
+              <a:rPr lang="en-US"/>
               <a:t>Click to edit Master subtitle style</a:t>
             </a:r>
-            <a:endParaRPr lang="en-US"/>
           </a:p>
         </p:txBody>
       </p:sp>
@@ -641,7 +656,7 @@
           <a:p>
             <a:fld id="{78C97017-6FC3-485B-9764-EAC9E56C1D49}" type="datetimeFigureOut">
               <a:rPr lang="en-US" smtClean="0"/>
-              <a:t>10/16/2016</a:t>
+              <a:t>10/30/2018</a:t>
             </a:fld>
             <a:endParaRPr lang="en-US"/>
           </a:p>
@@ -735,10 +750,9 @@
           <a:lstStyle/>
           <a:p>
             <a:r>
-              <a:rPr lang="en-US" smtClean="0"/>
+              <a:rPr lang="en-US"/>
               <a:t>Click to edit Master title style</a:t>
             </a:r>
-            <a:endParaRPr lang="en-US"/>
           </a:p>
         </p:txBody>
       </p:sp>
@@ -759,38 +773,37 @@
           <a:p>
             <a:pPr lvl="0"/>
             <a:r>
-              <a:rPr lang="en-US" smtClean="0"/>
+              <a:rPr lang="en-US"/>
               <a:t>Click to edit Master text styles</a:t>
             </a:r>
           </a:p>
           <a:p>
             <a:pPr lvl="1"/>
             <a:r>
-              <a:rPr lang="en-US" smtClean="0"/>
+              <a:rPr lang="en-US"/>
               <a:t>Second level</a:t>
             </a:r>
           </a:p>
           <a:p>
             <a:pPr lvl="2"/>
             <a:r>
-              <a:rPr lang="en-US" smtClean="0"/>
+              <a:rPr lang="en-US"/>
               <a:t>Third level</a:t>
             </a:r>
           </a:p>
           <a:p>
             <a:pPr lvl="3"/>
             <a:r>
-              <a:rPr lang="en-US" smtClean="0"/>
+              <a:rPr lang="en-US"/>
               <a:t>Fourth level</a:t>
             </a:r>
           </a:p>
           <a:p>
             <a:pPr lvl="4"/>
             <a:r>
-              <a:rPr lang="en-US" smtClean="0"/>
+              <a:rPr lang="en-US"/>
               <a:t>Fifth level</a:t>
             </a:r>
-            <a:endParaRPr lang="en-US"/>
           </a:p>
         </p:txBody>
       </p:sp>
@@ -811,7 +824,7 @@
           <a:p>
             <a:fld id="{78C97017-6FC3-485B-9764-EAC9E56C1D49}" type="datetimeFigureOut">
               <a:rPr lang="en-US" smtClean="0"/>
-              <a:t>10/16/2016</a:t>
+              <a:t>10/30/2018</a:t>
             </a:fld>
             <a:endParaRPr lang="en-US"/>
           </a:p>
@@ -910,10 +923,9 @@
           <a:lstStyle/>
           <a:p>
             <a:r>
-              <a:rPr lang="en-US" smtClean="0"/>
+              <a:rPr lang="en-US"/>
               <a:t>Click to edit Master title style</a:t>
             </a:r>
-            <a:endParaRPr lang="en-US"/>
           </a:p>
         </p:txBody>
       </p:sp>
@@ -939,38 +951,37 @@
           <a:p>
             <a:pPr lvl="0"/>
             <a:r>
-              <a:rPr lang="en-US" smtClean="0"/>
+              <a:rPr lang="en-US"/>
               <a:t>Click to edit Master text styles</a:t>
             </a:r>
           </a:p>
           <a:p>
             <a:pPr lvl="1"/>
             <a:r>
-              <a:rPr lang="en-US" smtClean="0"/>
+              <a:rPr lang="en-US"/>
               <a:t>Second level</a:t>
             </a:r>
           </a:p>
           <a:p>
             <a:pPr lvl="2"/>
             <a:r>
-              <a:rPr lang="en-US" smtClean="0"/>
+              <a:rPr lang="en-US"/>
               <a:t>Third level</a:t>
             </a:r>
           </a:p>
           <a:p>
             <a:pPr lvl="3"/>
             <a:r>
-              <a:rPr lang="en-US" smtClean="0"/>
+              <a:rPr lang="en-US"/>
               <a:t>Fourth level</a:t>
             </a:r>
           </a:p>
           <a:p>
             <a:pPr lvl="4"/>
             <a:r>
-              <a:rPr lang="en-US" smtClean="0"/>
+              <a:rPr lang="en-US"/>
               <a:t>Fifth level</a:t>
             </a:r>
-            <a:endParaRPr lang="en-US"/>
           </a:p>
         </p:txBody>
       </p:sp>
@@ -991,7 +1002,7 @@
           <a:p>
             <a:fld id="{78C97017-6FC3-485B-9764-EAC9E56C1D49}" type="datetimeFigureOut">
               <a:rPr lang="en-US" smtClean="0"/>
-              <a:t>10/16/2016</a:t>
+              <a:t>10/30/2018</a:t>
             </a:fld>
             <a:endParaRPr lang="en-US"/>
           </a:p>
@@ -1085,10 +1096,9 @@
           <a:lstStyle/>
           <a:p>
             <a:r>
-              <a:rPr lang="en-US" smtClean="0"/>
+              <a:rPr lang="en-US"/>
               <a:t>Click to edit Master title style</a:t>
             </a:r>
-            <a:endParaRPr lang="en-US"/>
           </a:p>
         </p:txBody>
       </p:sp>
@@ -1109,38 +1119,37 @@
           <a:p>
             <a:pPr lvl="0"/>
             <a:r>
-              <a:rPr lang="en-US" smtClean="0"/>
+              <a:rPr lang="en-US"/>
               <a:t>Click to edit Master text styles</a:t>
             </a:r>
           </a:p>
           <a:p>
             <a:pPr lvl="1"/>
             <a:r>
-              <a:rPr lang="en-US" smtClean="0"/>
+              <a:rPr lang="en-US"/>
               <a:t>Second level</a:t>
             </a:r>
           </a:p>
           <a:p>
             <a:pPr lvl="2"/>
             <a:r>
-              <a:rPr lang="en-US" smtClean="0"/>
+              <a:rPr lang="en-US"/>
               <a:t>Third level</a:t>
             </a:r>
           </a:p>
           <a:p>
             <a:pPr lvl="3"/>
             <a:r>
-              <a:rPr lang="en-US" smtClean="0"/>
+              <a:rPr lang="en-US"/>
               <a:t>Fourth level</a:t>
             </a:r>
           </a:p>
           <a:p>
             <a:pPr lvl="4"/>
             <a:r>
-              <a:rPr lang="en-US" smtClean="0"/>
+              <a:rPr lang="en-US"/>
               <a:t>Fifth level</a:t>
             </a:r>
-            <a:endParaRPr lang="en-US"/>
           </a:p>
         </p:txBody>
       </p:sp>
@@ -1161,7 +1170,7 @@
           <a:p>
             <a:fld id="{78C97017-6FC3-485B-9764-EAC9E56C1D49}" type="datetimeFigureOut">
               <a:rPr lang="en-US" smtClean="0"/>
-              <a:t>10/16/2016</a:t>
+              <a:t>10/30/2018</a:t>
             </a:fld>
             <a:endParaRPr lang="en-US"/>
           </a:p>
@@ -1264,10 +1273,9 @@
           </a:lstStyle>
           <a:p>
             <a:r>
-              <a:rPr lang="en-US" smtClean="0"/>
+              <a:rPr lang="en-US"/>
               <a:t>Click to edit Master title style</a:t>
             </a:r>
-            <a:endParaRPr lang="en-US"/>
           </a:p>
         </p:txBody>
       </p:sp>
@@ -1384,7 +1392,7 @@
           <a:p>
             <a:pPr lvl="0"/>
             <a:r>
-              <a:rPr lang="en-US" smtClean="0"/>
+              <a:rPr lang="en-US"/>
               <a:t>Click to edit Master text styles</a:t>
             </a:r>
           </a:p>
@@ -1407,7 +1415,7 @@
           <a:p>
             <a:fld id="{78C97017-6FC3-485B-9764-EAC9E56C1D49}" type="datetimeFigureOut">
               <a:rPr lang="en-US" smtClean="0"/>
-              <a:t>10/16/2016</a:t>
+              <a:t>10/30/2018</a:t>
             </a:fld>
             <a:endParaRPr lang="en-US"/>
           </a:p>
@@ -1501,10 +1509,9 @@
           <a:lstStyle/>
           <a:p>
             <a:r>
-              <a:rPr lang="en-US" smtClean="0"/>
+              <a:rPr lang="en-US"/>
               <a:t>Click to edit Master title style</a:t>
             </a:r>
-            <a:endParaRPr lang="en-US"/>
           </a:p>
         </p:txBody>
       </p:sp>
@@ -1558,38 +1565,37 @@
           <a:p>
             <a:pPr lvl="0"/>
             <a:r>
-              <a:rPr lang="en-US" smtClean="0"/>
+              <a:rPr lang="en-US"/>
               <a:t>Click to edit Master text styles</a:t>
             </a:r>
           </a:p>
           <a:p>
             <a:pPr lvl="1"/>
             <a:r>
-              <a:rPr lang="en-US" smtClean="0"/>
+              <a:rPr lang="en-US"/>
               <a:t>Second level</a:t>
             </a:r>
           </a:p>
           <a:p>
             <a:pPr lvl="2"/>
             <a:r>
-              <a:rPr lang="en-US" smtClean="0"/>
+              <a:rPr lang="en-US"/>
               <a:t>Third level</a:t>
             </a:r>
           </a:p>
           <a:p>
             <a:pPr lvl="3"/>
             <a:r>
-              <a:rPr lang="en-US" smtClean="0"/>
+              <a:rPr lang="en-US"/>
               <a:t>Fourth level</a:t>
             </a:r>
           </a:p>
           <a:p>
             <a:pPr lvl="4"/>
             <a:r>
-              <a:rPr lang="en-US" smtClean="0"/>
+              <a:rPr lang="en-US"/>
               <a:t>Fifth level</a:t>
             </a:r>
-            <a:endParaRPr lang="en-US"/>
           </a:p>
         </p:txBody>
       </p:sp>
@@ -1643,38 +1649,37 @@
           <a:p>
             <a:pPr lvl="0"/>
             <a:r>
-              <a:rPr lang="en-US" smtClean="0"/>
+              <a:rPr lang="en-US"/>
               <a:t>Click to edit Master text styles</a:t>
             </a:r>
           </a:p>
           <a:p>
             <a:pPr lvl="1"/>
             <a:r>
-              <a:rPr lang="en-US" smtClean="0"/>
+              <a:rPr lang="en-US"/>
               <a:t>Second level</a:t>
             </a:r>
           </a:p>
           <a:p>
             <a:pPr lvl="2"/>
             <a:r>
-              <a:rPr lang="en-US" smtClean="0"/>
+              <a:rPr lang="en-US"/>
               <a:t>Third level</a:t>
             </a:r>
           </a:p>
           <a:p>
             <a:pPr lvl="3"/>
             <a:r>
-              <a:rPr lang="en-US" smtClean="0"/>
+              <a:rPr lang="en-US"/>
               <a:t>Fourth level</a:t>
             </a:r>
           </a:p>
           <a:p>
             <a:pPr lvl="4"/>
             <a:r>
-              <a:rPr lang="en-US" smtClean="0"/>
+              <a:rPr lang="en-US"/>
               <a:t>Fifth level</a:t>
             </a:r>
-            <a:endParaRPr lang="en-US"/>
           </a:p>
         </p:txBody>
       </p:sp>
@@ -1695,7 +1700,7 @@
           <a:p>
             <a:fld id="{78C97017-6FC3-485B-9764-EAC9E56C1D49}" type="datetimeFigureOut">
               <a:rPr lang="en-US" smtClean="0"/>
-              <a:t>10/16/2016</a:t>
+              <a:t>10/30/2018</a:t>
             </a:fld>
             <a:endParaRPr lang="en-US"/>
           </a:p>
@@ -1793,10 +1798,9 @@
           </a:lstStyle>
           <a:p>
             <a:r>
-              <a:rPr lang="en-US" smtClean="0"/>
+              <a:rPr lang="en-US"/>
               <a:t>Click to edit Master title style</a:t>
             </a:r>
-            <a:endParaRPr lang="en-US"/>
           </a:p>
         </p:txBody>
       </p:sp>
@@ -1859,7 +1863,7 @@
           <a:p>
             <a:pPr lvl="0"/>
             <a:r>
-              <a:rPr lang="en-US" smtClean="0"/>
+              <a:rPr lang="en-US"/>
               <a:t>Click to edit Master text styles</a:t>
             </a:r>
           </a:p>
@@ -1915,38 +1919,37 @@
           <a:p>
             <a:pPr lvl="0"/>
             <a:r>
-              <a:rPr lang="en-US" smtClean="0"/>
+              <a:rPr lang="en-US"/>
               <a:t>Click to edit Master text styles</a:t>
             </a:r>
           </a:p>
           <a:p>
             <a:pPr lvl="1"/>
             <a:r>
-              <a:rPr lang="en-US" smtClean="0"/>
+              <a:rPr lang="en-US"/>
               <a:t>Second level</a:t>
             </a:r>
           </a:p>
           <a:p>
             <a:pPr lvl="2"/>
             <a:r>
-              <a:rPr lang="en-US" smtClean="0"/>
+              <a:rPr lang="en-US"/>
               <a:t>Third level</a:t>
             </a:r>
           </a:p>
           <a:p>
             <a:pPr lvl="3"/>
             <a:r>
-              <a:rPr lang="en-US" smtClean="0"/>
+              <a:rPr lang="en-US"/>
               <a:t>Fourth level</a:t>
             </a:r>
           </a:p>
           <a:p>
             <a:pPr lvl="4"/>
             <a:r>
-              <a:rPr lang="en-US" smtClean="0"/>
+              <a:rPr lang="en-US"/>
               <a:t>Fifth level</a:t>
             </a:r>
-            <a:endParaRPr lang="en-US"/>
           </a:p>
         </p:txBody>
       </p:sp>
@@ -2009,7 +2012,7 @@
           <a:p>
             <a:pPr lvl="0"/>
             <a:r>
-              <a:rPr lang="en-US" smtClean="0"/>
+              <a:rPr lang="en-US"/>
               <a:t>Click to edit Master text styles</a:t>
             </a:r>
           </a:p>
@@ -2065,38 +2068,37 @@
           <a:p>
             <a:pPr lvl="0"/>
             <a:r>
-              <a:rPr lang="en-US" smtClean="0"/>
+              <a:rPr lang="en-US"/>
               <a:t>Click to edit Master text styles</a:t>
             </a:r>
           </a:p>
           <a:p>
             <a:pPr lvl="1"/>
             <a:r>
-              <a:rPr lang="en-US" smtClean="0"/>
+              <a:rPr lang="en-US"/>
               <a:t>Second level</a:t>
             </a:r>
           </a:p>
           <a:p>
             <a:pPr lvl="2"/>
             <a:r>
-              <a:rPr lang="en-US" smtClean="0"/>
+              <a:rPr lang="en-US"/>
               <a:t>Third level</a:t>
             </a:r>
           </a:p>
           <a:p>
             <a:pPr lvl="3"/>
             <a:r>
-              <a:rPr lang="en-US" smtClean="0"/>
+              <a:rPr lang="en-US"/>
               <a:t>Fourth level</a:t>
             </a:r>
           </a:p>
           <a:p>
             <a:pPr lvl="4"/>
             <a:r>
-              <a:rPr lang="en-US" smtClean="0"/>
+              <a:rPr lang="en-US"/>
               <a:t>Fifth level</a:t>
             </a:r>
-            <a:endParaRPr lang="en-US"/>
           </a:p>
         </p:txBody>
       </p:sp>
@@ -2117,7 +2119,7 @@
           <a:p>
             <a:fld id="{78C97017-6FC3-485B-9764-EAC9E56C1D49}" type="datetimeFigureOut">
               <a:rPr lang="en-US" smtClean="0"/>
-              <a:t>10/16/2016</a:t>
+              <a:t>10/30/2018</a:t>
             </a:fld>
             <a:endParaRPr lang="en-US"/>
           </a:p>
@@ -2211,10 +2213,9 @@
           <a:lstStyle/>
           <a:p>
             <a:r>
-              <a:rPr lang="en-US" smtClean="0"/>
+              <a:rPr lang="en-US"/>
               <a:t>Click to edit Master title style</a:t>
             </a:r>
-            <a:endParaRPr lang="en-US"/>
           </a:p>
         </p:txBody>
       </p:sp>
@@ -2235,7 +2236,7 @@
           <a:p>
             <a:fld id="{78C97017-6FC3-485B-9764-EAC9E56C1D49}" type="datetimeFigureOut">
               <a:rPr lang="en-US" smtClean="0"/>
-              <a:t>10/16/2016</a:t>
+              <a:t>10/30/2018</a:t>
             </a:fld>
             <a:endParaRPr lang="en-US"/>
           </a:p>
@@ -2330,7 +2331,7 @@
           <a:p>
             <a:fld id="{78C97017-6FC3-485B-9764-EAC9E56C1D49}" type="datetimeFigureOut">
               <a:rPr lang="en-US" smtClean="0"/>
-              <a:t>10/16/2016</a:t>
+              <a:t>10/30/2018</a:t>
             </a:fld>
             <a:endParaRPr lang="en-US"/>
           </a:p>
@@ -2433,10 +2434,9 @@
           </a:lstStyle>
           <a:p>
             <a:r>
-              <a:rPr lang="en-US" smtClean="0"/>
+              <a:rPr lang="en-US"/>
               <a:t>Click to edit Master title style</a:t>
             </a:r>
-            <a:endParaRPr lang="en-US"/>
           </a:p>
         </p:txBody>
       </p:sp>
@@ -2490,38 +2490,37 @@
           <a:p>
             <a:pPr lvl="0"/>
             <a:r>
-              <a:rPr lang="en-US" smtClean="0"/>
+              <a:rPr lang="en-US"/>
               <a:t>Click to edit Master text styles</a:t>
             </a:r>
           </a:p>
           <a:p>
             <a:pPr lvl="1"/>
             <a:r>
-              <a:rPr lang="en-US" smtClean="0"/>
+              <a:rPr lang="en-US"/>
               <a:t>Second level</a:t>
             </a:r>
           </a:p>
           <a:p>
             <a:pPr lvl="2"/>
             <a:r>
-              <a:rPr lang="en-US" smtClean="0"/>
+              <a:rPr lang="en-US"/>
               <a:t>Third level</a:t>
             </a:r>
           </a:p>
           <a:p>
             <a:pPr lvl="3"/>
             <a:r>
-              <a:rPr lang="en-US" smtClean="0"/>
+              <a:rPr lang="en-US"/>
               <a:t>Fourth level</a:t>
             </a:r>
           </a:p>
           <a:p>
             <a:pPr lvl="4"/>
             <a:r>
-              <a:rPr lang="en-US" smtClean="0"/>
+              <a:rPr lang="en-US"/>
               <a:t>Fifth level</a:t>
             </a:r>
-            <a:endParaRPr lang="en-US"/>
           </a:p>
         </p:txBody>
       </p:sp>
@@ -2584,7 +2583,7 @@
           <a:p>
             <a:pPr lvl="0"/>
             <a:r>
-              <a:rPr lang="en-US" smtClean="0"/>
+              <a:rPr lang="en-US"/>
               <a:t>Click to edit Master text styles</a:t>
             </a:r>
           </a:p>
@@ -2607,7 +2606,7 @@
           <a:p>
             <a:fld id="{78C97017-6FC3-485B-9764-EAC9E56C1D49}" type="datetimeFigureOut">
               <a:rPr lang="en-US" smtClean="0"/>
-              <a:t>10/16/2016</a:t>
+              <a:t>10/30/2018</a:t>
             </a:fld>
             <a:endParaRPr lang="en-US"/>
           </a:p>
@@ -2710,10 +2709,9 @@
           </a:lstStyle>
           <a:p>
             <a:r>
-              <a:rPr lang="en-US" smtClean="0"/>
+              <a:rPr lang="en-US"/>
               <a:t>Click to edit Master title style</a:t>
             </a:r>
-            <a:endParaRPr lang="en-US"/>
           </a:p>
         </p:txBody>
       </p:sp>
@@ -2837,7 +2835,7 @@
           <a:p>
             <a:pPr lvl="0"/>
             <a:r>
-              <a:rPr lang="en-US" smtClean="0"/>
+              <a:rPr lang="en-US"/>
               <a:t>Click to edit Master text styles</a:t>
             </a:r>
           </a:p>
@@ -2860,7 +2858,7 @@
           <a:p>
             <a:fld id="{78C97017-6FC3-485B-9764-EAC9E56C1D49}" type="datetimeFigureOut">
               <a:rPr lang="en-US" smtClean="0"/>
-              <a:t>10/16/2016</a:t>
+              <a:t>10/30/2018</a:t>
             </a:fld>
             <a:endParaRPr lang="en-US"/>
           </a:p>
@@ -2969,10 +2967,9 @@
           <a:lstStyle/>
           <a:p>
             <a:r>
-              <a:rPr lang="en-US" smtClean="0"/>
+              <a:rPr lang="en-US"/>
               <a:t>Click to edit Master title style</a:t>
             </a:r>
-            <a:endParaRPr lang="en-US"/>
           </a:p>
         </p:txBody>
       </p:sp>
@@ -3003,38 +3000,37 @@
           <a:p>
             <a:pPr lvl="0"/>
             <a:r>
-              <a:rPr lang="en-US" smtClean="0"/>
+              <a:rPr lang="en-US"/>
               <a:t>Click to edit Master text styles</a:t>
             </a:r>
           </a:p>
           <a:p>
             <a:pPr lvl="1"/>
             <a:r>
-              <a:rPr lang="en-US" smtClean="0"/>
+              <a:rPr lang="en-US"/>
               <a:t>Second level</a:t>
             </a:r>
           </a:p>
           <a:p>
             <a:pPr lvl="2"/>
             <a:r>
-              <a:rPr lang="en-US" smtClean="0"/>
+              <a:rPr lang="en-US"/>
               <a:t>Third level</a:t>
             </a:r>
           </a:p>
           <a:p>
             <a:pPr lvl="3"/>
             <a:r>
-              <a:rPr lang="en-US" smtClean="0"/>
+              <a:rPr lang="en-US"/>
               <a:t>Fourth level</a:t>
             </a:r>
           </a:p>
           <a:p>
             <a:pPr lvl="4"/>
             <a:r>
-              <a:rPr lang="en-US" smtClean="0"/>
+              <a:rPr lang="en-US"/>
               <a:t>Fifth level</a:t>
             </a:r>
-            <a:endParaRPr lang="en-US"/>
           </a:p>
         </p:txBody>
       </p:sp>
@@ -3073,7 +3069,7 @@
           <a:p>
             <a:fld id="{78C97017-6FC3-485B-9764-EAC9E56C1D49}" type="datetimeFigureOut">
               <a:rPr lang="en-US" smtClean="0"/>
-              <a:t>10/16/2016</a:t>
+              <a:t>10/30/2018</a:t>
             </a:fld>
             <a:endParaRPr lang="en-US"/>
           </a:p>
@@ -3492,7 +3488,7 @@
           <a:p>
             <a:pPr algn="ctr"/>
             <a:r>
-              <a:rPr lang="en-US" sz="1600" dirty="0" smtClean="0">
+              <a:rPr lang="en-US" sz="1600" dirty="0">
                 <a:solidFill>
                   <a:schemeClr val="bg1"/>
                 </a:solidFill>
@@ -3856,7 +3852,7 @@
           <a:p>
             <a:pPr algn="ctr"/>
             <a:r>
-              <a:rPr lang="en-US" sz="1600" dirty="0" smtClean="0">
+              <a:rPr lang="en-US" sz="1600" dirty="0">
                 <a:solidFill>
                   <a:schemeClr val="bg1"/>
                 </a:solidFill>
@@ -4003,7 +3999,7 @@
           <a:p>
             <a:pPr algn="ctr"/>
             <a:r>
-              <a:rPr lang="en-US" sz="1600" dirty="0" smtClean="0">
+              <a:rPr lang="en-US" sz="1600" dirty="0">
                 <a:solidFill>
                   <a:schemeClr val="bg1"/>
                 </a:solidFill>
@@ -4165,10 +4161,9 @@
           <a:lstStyle/>
           <a:p>
             <a:r>
-              <a:rPr lang="en-US" sz="1400" dirty="0" smtClean="0"/>
+              <a:rPr lang="en-US" sz="1400" dirty="0"/>
               <a:t>delete 1</a:t>
             </a:r>
-            <a:endParaRPr lang="en-US" sz="1400" dirty="0"/>
           </a:p>
         </p:txBody>
       </p:sp>
@@ -4231,18 +4226,13 @@
           <a:lstStyle/>
           <a:p>
             <a:r>
-              <a:rPr lang="en-US" sz="1400" dirty="0" smtClean="0">
+              <a:rPr lang="en-US" sz="1400" dirty="0">
                 <a:solidFill>
                   <a:srgbClr val="0070C0"/>
                 </a:solidFill>
               </a:rPr>
               <a:t>execute(“delete 1”)</a:t>
             </a:r>
-            <a:endParaRPr lang="en-US" sz="1400" dirty="0">
-              <a:solidFill>
-                <a:srgbClr val="0070C0"/>
-              </a:solidFill>
-            </a:endParaRPr>
           </a:p>
         </p:txBody>
       </p:sp>
@@ -4305,7 +4295,7 @@
           <a:lstStyle/>
           <a:p>
             <a:r>
-              <a:rPr lang="en-US" sz="1400" dirty="0" err="1" smtClean="0">
+              <a:rPr lang="en-US" sz="1400" dirty="0" err="1">
                 <a:solidFill>
                   <a:srgbClr val="7030A0"/>
                 </a:solidFill>
@@ -4313,18 +4303,13 @@
               <a:t>deletePerson</a:t>
             </a:r>
             <a:r>
-              <a:rPr lang="en-US" sz="1400" dirty="0" smtClean="0">
+              <a:rPr lang="en-US" sz="1400" dirty="0">
                 <a:solidFill>
                   <a:srgbClr val="7030A0"/>
                 </a:solidFill>
               </a:rPr>
               <a:t>(p)</a:t>
             </a:r>
-            <a:endParaRPr lang="en-US" sz="1400" dirty="0">
-              <a:solidFill>
-                <a:srgbClr val="7030A0"/>
-              </a:solidFill>
-            </a:endParaRPr>
           </a:p>
         </p:txBody>
       </p:sp>
@@ -4351,7 +4336,7 @@
           <a:lstStyle/>
           <a:p>
             <a:r>
-              <a:rPr lang="en-US" sz="1400" dirty="0" smtClean="0">
+              <a:rPr lang="en-US" sz="1400" dirty="0">
                 <a:solidFill>
                   <a:schemeClr val="accent5">
                     <a:lumMod val="75000"/>
@@ -4361,7 +4346,7 @@
               <a:t>post(</a:t>
             </a:r>
             <a:r>
-              <a:rPr lang="en-US" sz="1400" dirty="0" err="1" smtClean="0">
+              <a:rPr lang="en-US" sz="1400" dirty="0" err="1">
                 <a:solidFill>
                   <a:schemeClr val="accent5">
                     <a:lumMod val="75000"/>
@@ -4371,7 +4356,7 @@
               <a:t>AddressBookChangedEvent</a:t>
             </a:r>
             <a:r>
-              <a:rPr lang="en-US" sz="1400" dirty="0" smtClean="0">
+              <a:rPr lang="en-US" sz="1400" dirty="0">
                 <a:solidFill>
                   <a:schemeClr val="accent5">
                     <a:lumMod val="75000"/>
@@ -4380,13 +4365,6 @@
               </a:rPr>
               <a:t>)</a:t>
             </a:r>
-            <a:endParaRPr lang="en-US" sz="1400" dirty="0">
-              <a:solidFill>
-                <a:schemeClr val="accent5">
-                  <a:lumMod val="75000"/>
-                </a:schemeClr>
-              </a:solidFill>
-            </a:endParaRPr>
           </a:p>
         </p:txBody>
       </p:sp>
@@ -4552,7 +4530,7 @@
           <a:p>
             <a:pPr algn="ctr"/>
             <a:r>
-              <a:rPr lang="en-US" sz="1600" dirty="0" smtClean="0">
+              <a:rPr lang="en-US" sz="1600" dirty="0">
                 <a:solidFill>
                   <a:schemeClr val="bg1"/>
                 </a:solidFill>
@@ -4560,7 +4538,7 @@
               <a:t>:</a:t>
             </a:r>
             <a:r>
-              <a:rPr lang="en-US" sz="1600" dirty="0" err="1" smtClean="0">
+              <a:rPr lang="en-US" sz="1600" dirty="0" err="1">
                 <a:solidFill>
                   <a:schemeClr val="bg1"/>
                 </a:solidFill>
@@ -4793,7 +4771,7 @@
           <a:p>
             <a:pPr algn="ctr"/>
             <a:r>
-              <a:rPr lang="en-US" sz="1600" dirty="0" smtClean="0">
+              <a:rPr lang="en-US" sz="1600" dirty="0">
                 <a:solidFill>
                   <a:schemeClr val="bg1"/>
                 </a:solidFill>
@@ -4925,7 +4903,7 @@
           <a:lstStyle/>
           <a:p>
             <a:r>
-              <a:rPr lang="en-US" sz="1400" dirty="0" smtClean="0">
+              <a:rPr lang="en-US" sz="1400" dirty="0">
                 <a:solidFill>
                   <a:schemeClr val="accent5">
                     <a:lumMod val="75000"/>
@@ -4935,7 +4913,7 @@
               <a:t>post(</a:t>
             </a:r>
             <a:r>
-              <a:rPr lang="en-US" sz="1400" dirty="0" err="1" smtClean="0">
+              <a:rPr lang="en-US" sz="1400" dirty="0" err="1">
                 <a:solidFill>
                   <a:schemeClr val="accent5">
                     <a:lumMod val="75000"/>
@@ -4945,7 +4923,7 @@
               <a:t>AddressBookChangedEvent</a:t>
             </a:r>
             <a:r>
-              <a:rPr lang="en-US" sz="1400" dirty="0" smtClean="0">
+              <a:rPr lang="en-US" sz="1400" dirty="0">
                 <a:solidFill>
                   <a:schemeClr val="accent5">
                     <a:lumMod val="75000"/>
@@ -4954,13 +4932,6 @@
               </a:rPr>
               <a:t>)</a:t>
             </a:r>
-            <a:endParaRPr lang="en-US" sz="1400" dirty="0">
-              <a:solidFill>
-                <a:schemeClr val="accent5">
-                  <a:lumMod val="75000"/>
-                </a:schemeClr>
-              </a:solidFill>
-            </a:endParaRPr>
           </a:p>
         </p:txBody>
       </p:sp>
@@ -5052,7 +5023,7 @@
           <a:p>
             <a:pPr algn="ctr"/>
             <a:r>
-              <a:rPr lang="en-US" sz="1600" dirty="0" smtClean="0">
+              <a:rPr lang="en-US" sz="1600" dirty="0">
                 <a:solidFill>
                   <a:schemeClr val="bg1"/>
                 </a:solidFill>
@@ -5060,7 +5031,7 @@
               <a:t>:</a:t>
             </a:r>
             <a:r>
-              <a:rPr lang="en-US" sz="1600" dirty="0" err="1" smtClean="0">
+              <a:rPr lang="en-US" sz="1600" dirty="0" err="1">
                 <a:solidFill>
                   <a:schemeClr val="bg1"/>
                 </a:solidFill>
@@ -5307,7 +5278,7 @@
           <a:lstStyle/>
           <a:p>
             <a:r>
-              <a:rPr lang="en-US" sz="1400" dirty="0" err="1" smtClean="0">
+              <a:rPr lang="en-US" sz="1400" dirty="0" err="1">
                 <a:solidFill>
                   <a:schemeClr val="accent6">
                     <a:lumMod val="75000"/>
@@ -5317,7 +5288,7 @@
               <a:t>handleAddresssBookChangedEvent</a:t>
             </a:r>
             <a:r>
-              <a:rPr lang="en-US" sz="1400" dirty="0" smtClean="0">
+              <a:rPr lang="en-US" sz="1400" dirty="0">
                 <a:solidFill>
                   <a:schemeClr val="accent6">
                     <a:lumMod val="75000"/>
@@ -5326,13 +5297,6 @@
               </a:rPr>
               <a:t>()</a:t>
             </a:r>
-            <a:endParaRPr lang="en-US" sz="1400" dirty="0">
-              <a:solidFill>
-                <a:schemeClr val="accent6">
-                  <a:lumMod val="75000"/>
-                </a:schemeClr>
-              </a:solidFill>
-            </a:endParaRPr>
           </a:p>
         </p:txBody>
       </p:sp>
@@ -5417,7 +5381,7 @@
           <a:p>
             <a:pPr algn="ctr"/>
             <a:r>
-              <a:rPr lang="en-US" sz="1600" dirty="0" smtClean="0">
+              <a:rPr lang="en-US" sz="1600" dirty="0">
                 <a:solidFill>
                   <a:schemeClr val="bg1"/>
                 </a:solidFill>
@@ -5620,7 +5584,7 @@
           <a:lstStyle/>
           <a:p>
             <a:r>
-              <a:rPr lang="en-US" sz="1400" dirty="0" err="1" smtClean="0">
+              <a:rPr lang="en-US" sz="1400" dirty="0" err="1">
                 <a:solidFill>
                   <a:srgbClr val="00B050"/>
                 </a:solidFill>
@@ -5628,18 +5592,13 @@
               <a:t>handleAddresssBookChangedEvent</a:t>
             </a:r>
             <a:r>
-              <a:rPr lang="en-US" sz="1400" dirty="0" smtClean="0">
+              <a:rPr lang="en-US" sz="1400" dirty="0">
                 <a:solidFill>
                   <a:srgbClr val="00B050"/>
                 </a:solidFill>
               </a:rPr>
               <a:t>()</a:t>
             </a:r>
-            <a:endParaRPr lang="en-US" sz="1400" dirty="0">
-              <a:solidFill>
-                <a:srgbClr val="00B050"/>
-              </a:solidFill>
-            </a:endParaRPr>
           </a:p>
         </p:txBody>
       </p:sp>
@@ -5826,18 +5785,13 @@
           <a:p>
             <a:pPr algn="r"/>
             <a:r>
-              <a:rPr lang="en-US" sz="1400" dirty="0" smtClean="0">
+              <a:rPr lang="en-US" sz="1400" dirty="0">
                 <a:solidFill>
                   <a:srgbClr val="00B050"/>
                 </a:solidFill>
               </a:rPr>
               <a:t>Update status bar</a:t>
             </a:r>
-            <a:endParaRPr lang="en-US" sz="1400" dirty="0">
-              <a:solidFill>
-                <a:srgbClr val="00B050"/>
-              </a:solidFill>
-            </a:endParaRPr>
           </a:p>
         </p:txBody>
       </p:sp>
@@ -6027,7 +5981,7 @@
           <a:lstStyle/>
           <a:p>
             <a:r>
-              <a:rPr lang="en-US" sz="1400" dirty="0" smtClean="0">
+              <a:rPr lang="en-US" sz="1400" dirty="0">
                 <a:solidFill>
                   <a:schemeClr val="accent6">
                     <a:lumMod val="75000"/>
@@ -6037,7 +5991,7 @@
               <a:t>Save </a:t>
             </a:r>
             <a:br>
-              <a:rPr lang="en-US" sz="1400" dirty="0" smtClean="0">
+              <a:rPr lang="en-US" sz="1400" dirty="0">
                 <a:solidFill>
                   <a:schemeClr val="accent6">
                     <a:lumMod val="75000"/>
@@ -6046,7 +6000,7 @@
               </a:rPr>
             </a:br>
             <a:r>
-              <a:rPr lang="en-US" sz="1400" dirty="0" smtClean="0">
+              <a:rPr lang="en-US" sz="1400" dirty="0">
                 <a:solidFill>
                   <a:schemeClr val="accent6">
                     <a:lumMod val="75000"/>
@@ -6055,20 +6009,3356 @@
               </a:rPr>
               <a:t>to file</a:t>
             </a:r>
-            <a:endParaRPr lang="en-US" sz="1400" dirty="0">
+          </a:p>
+        </p:txBody>
+      </p:sp>
+    </p:spTree>
+    <p:extLst>
+      <p:ext uri="{BB962C8B-B14F-4D97-AF65-F5344CB8AC3E}">
+        <p14:creationId xmlns:p14="http://schemas.microsoft.com/office/powerpoint/2010/main" val="4023378879"/>
+      </p:ext>
+    </p:extLst>
+  </p:cSld>
+  <p:clrMapOvr>
+    <a:masterClrMapping/>
+  </p:clrMapOvr>
+</p:sld>
+</file>
+
+<file path=ppt/slides/slide2.xml><?xml version="1.0" encoding="utf-8"?>
+<p:sld xmlns:a="http://schemas.openxmlformats.org/drawingml/2006/main" xmlns:r="http://schemas.openxmlformats.org/officeDocument/2006/relationships" xmlns:p="http://schemas.openxmlformats.org/presentationml/2006/main">
+  <p:cSld>
+    <p:spTree>
+      <p:nvGrpSpPr>
+        <p:cNvPr id="1" name=""/>
+        <p:cNvGrpSpPr/>
+        <p:nvPr/>
+      </p:nvGrpSpPr>
+      <p:grpSpPr>
+        <a:xfrm>
+          <a:off x="0" y="0"/>
+          <a:ext cx="0" cy="0"/>
+          <a:chOff x="0" y="0"/>
+          <a:chExt cx="0" cy="0"/>
+        </a:xfrm>
+      </p:grpSpPr>
+      <p:sp>
+        <p:nvSpPr>
+          <p:cNvPr id="2" name="Rectangle 62"/>
+          <p:cNvSpPr/>
+          <p:nvPr/>
+        </p:nvSpPr>
+        <p:spPr>
+          <a:xfrm>
+            <a:off x="1111860" y="607926"/>
+            <a:ext cx="1093635" cy="346760"/>
+          </a:xfrm>
+          <a:prstGeom prst="rect">
+            <a:avLst/>
+          </a:prstGeom>
+          <a:solidFill>
+            <a:srgbClr val="00B050"/>
+          </a:solidFill>
+          <a:ln w="19050">
+            <a:solidFill>
+              <a:srgbClr val="00B050"/>
+            </a:solidFill>
+          </a:ln>
+          <a:effectLst/>
+        </p:spPr>
+        <p:style>
+          <a:lnRef idx="1">
+            <a:schemeClr val="accent2"/>
+          </a:lnRef>
+          <a:fillRef idx="2">
+            <a:schemeClr val="accent2"/>
+          </a:fillRef>
+          <a:effectRef idx="1">
+            <a:schemeClr val="accent2"/>
+          </a:effectRef>
+          <a:fontRef idx="minor">
+            <a:schemeClr val="dk1"/>
+          </a:fontRef>
+        </p:style>
+        <p:txBody>
+          <a:bodyPr rtlCol="0" anchor="ctr"/>
+          <a:lstStyle/>
+          <a:p>
+            <a:pPr algn="ctr"/>
+            <a:r>
+              <a:rPr lang="en-US" sz="1600" dirty="0">
+                <a:solidFill>
+                  <a:schemeClr val="bg1"/>
+                </a:solidFill>
+              </a:rPr>
+              <a:t>:UI</a:t>
+            </a:r>
+            <a:endParaRPr lang="en-SG" sz="1600" dirty="0">
+              <a:solidFill>
+                <a:schemeClr val="bg1"/>
+              </a:solidFill>
+            </a:endParaRPr>
+          </a:p>
+        </p:txBody>
+      </p:sp>
+      <p:cxnSp>
+        <p:nvCxnSpPr>
+          <p:cNvPr id="5" name="Straight Connector 4"/>
+          <p:cNvCxnSpPr/>
+          <p:nvPr/>
+        </p:nvCxnSpPr>
+        <p:spPr>
+          <a:xfrm>
+            <a:off x="1658677" y="971597"/>
+            <a:ext cx="0" cy="1723059"/>
+          </a:xfrm>
+          <a:prstGeom prst="line">
+            <a:avLst/>
+          </a:prstGeom>
+          <a:ln w="19050">
+            <a:solidFill>
+              <a:srgbClr val="00B050"/>
+            </a:solidFill>
+            <a:prstDash val="sysDash"/>
+          </a:ln>
+          <a:effectLst/>
+        </p:spPr>
+        <p:style>
+          <a:lnRef idx="1">
+            <a:schemeClr val="accent1"/>
+          </a:lnRef>
+          <a:fillRef idx="2">
+            <a:schemeClr val="accent1"/>
+          </a:fillRef>
+          <a:effectRef idx="1">
+            <a:schemeClr val="accent1"/>
+          </a:effectRef>
+          <a:fontRef idx="minor">
+            <a:schemeClr val="dk1"/>
+          </a:fontRef>
+        </p:style>
+      </p:cxnSp>
+      <p:sp>
+        <p:nvSpPr>
+          <p:cNvPr id="6" name="Rectangle 5"/>
+          <p:cNvSpPr/>
+          <p:nvPr/>
+        </p:nvSpPr>
+        <p:spPr>
+          <a:xfrm>
+            <a:off x="1586669" y="1322292"/>
+            <a:ext cx="152400" cy="1019910"/>
+          </a:xfrm>
+          <a:prstGeom prst="rect">
+            <a:avLst/>
+          </a:prstGeom>
+          <a:solidFill>
+            <a:srgbClr val="00B050"/>
+          </a:solidFill>
+          <a:ln>
+            <a:solidFill>
+              <a:srgbClr val="00B050"/>
+            </a:solidFill>
+          </a:ln>
+          <a:effectLst/>
+        </p:spPr>
+        <p:style>
+          <a:lnRef idx="1">
+            <a:schemeClr val="accent3"/>
+          </a:lnRef>
+          <a:fillRef idx="2">
+            <a:schemeClr val="accent3"/>
+          </a:fillRef>
+          <a:effectRef idx="1">
+            <a:schemeClr val="accent3"/>
+          </a:effectRef>
+          <a:fontRef idx="minor">
+            <a:schemeClr val="dk1"/>
+          </a:fontRef>
+        </p:style>
+        <p:txBody>
+          <a:bodyPr rtlCol="0" anchor="ctr"/>
+          <a:lstStyle/>
+          <a:p>
+            <a:pPr algn="ctr"/>
+            <a:endParaRPr lang="en-SG" sz="1400">
+              <a:solidFill>
+                <a:schemeClr val="dk1"/>
+              </a:solidFill>
+            </a:endParaRPr>
+          </a:p>
+        </p:txBody>
+      </p:sp>
+      <p:grpSp>
+        <p:nvGrpSpPr>
+          <p:cNvPr id="7" name="Actor"/>
+          <p:cNvGrpSpPr/>
+          <p:nvPr/>
+        </p:nvGrpSpPr>
+        <p:grpSpPr>
+          <a:xfrm>
+            <a:off x="152400" y="533400"/>
+            <a:ext cx="324036" cy="573410"/>
+            <a:chOff x="3239901" y="4149080"/>
+            <a:chExt cx="648072" cy="1146820"/>
+          </a:xfrm>
+        </p:grpSpPr>
+        <p:sp>
+          <p:nvSpPr>
+            <p:cNvPr id="8" name="Flowchart: Connector 7"/>
+            <p:cNvSpPr/>
+            <p:nvPr/>
+          </p:nvSpPr>
+          <p:spPr>
+            <a:xfrm>
+              <a:off x="3419872" y="4149080"/>
+              <a:ext cx="288032" cy="288032"/>
+            </a:xfrm>
+            <a:prstGeom prst="flowChartConnector">
+              <a:avLst/>
+            </a:prstGeom>
+            <a:solidFill>
+              <a:schemeClr val="bg1">
+                <a:lumMod val="85000"/>
+              </a:schemeClr>
+            </a:solidFill>
+            <a:ln w="28575">
+              <a:solidFill>
+                <a:schemeClr val="tx1"/>
+              </a:solidFill>
+            </a:ln>
+            <a:effectLst/>
+          </p:spPr>
+          <p:style>
+            <a:lnRef idx="1">
+              <a:schemeClr val="accent4"/>
+            </a:lnRef>
+            <a:fillRef idx="2">
+              <a:schemeClr val="accent4"/>
+            </a:fillRef>
+            <a:effectRef idx="1">
+              <a:schemeClr val="accent4"/>
+            </a:effectRef>
+            <a:fontRef idx="minor">
+              <a:schemeClr val="dk1"/>
+            </a:fontRef>
+          </p:style>
+          <p:txBody>
+            <a:bodyPr rtlCol="0" anchor="ctr"/>
+            <a:lstStyle/>
+            <a:p>
+              <a:pPr algn="ctr"/>
+              <a:endParaRPr lang="en-SG"/>
+            </a:p>
+          </p:txBody>
+        </p:sp>
+        <p:cxnSp>
+          <p:nvCxnSpPr>
+            <p:cNvPr id="9" name="Straight Connector 8"/>
+            <p:cNvCxnSpPr>
+              <a:stCxn id="8" idx="4"/>
+            </p:cNvCxnSpPr>
+            <p:nvPr/>
+          </p:nvCxnSpPr>
+          <p:spPr>
+            <a:xfrm>
+              <a:off x="3563888" y="4437112"/>
+              <a:ext cx="0" cy="504056"/>
+            </a:xfrm>
+            <a:prstGeom prst="line">
+              <a:avLst/>
+            </a:prstGeom>
+            <a:ln w="28575">
+              <a:solidFill>
+                <a:schemeClr val="tx1"/>
+              </a:solidFill>
+            </a:ln>
+            <a:effectLst/>
+          </p:spPr>
+          <p:style>
+            <a:lnRef idx="1">
+              <a:schemeClr val="accent4"/>
+            </a:lnRef>
+            <a:fillRef idx="2">
+              <a:schemeClr val="accent4"/>
+            </a:fillRef>
+            <a:effectRef idx="1">
+              <a:schemeClr val="accent4"/>
+            </a:effectRef>
+            <a:fontRef idx="minor">
+              <a:schemeClr val="dk1"/>
+            </a:fontRef>
+          </p:style>
+        </p:cxnSp>
+        <p:sp>
+          <p:nvSpPr>
+            <p:cNvPr id="10" name="Freeform 9"/>
+            <p:cNvSpPr/>
+            <p:nvPr/>
+          </p:nvSpPr>
+          <p:spPr>
+            <a:xfrm>
+              <a:off x="3324225" y="4933950"/>
+              <a:ext cx="479425" cy="361950"/>
+            </a:xfrm>
+            <a:custGeom>
+              <a:avLst/>
+              <a:gdLst>
+                <a:gd name="connsiteX0" fmla="*/ 0 w 479425"/>
+                <a:gd name="connsiteY0" fmla="*/ 355600 h 361950"/>
+                <a:gd name="connsiteX1" fmla="*/ 241300 w 479425"/>
+                <a:gd name="connsiteY1" fmla="*/ 0 h 361950"/>
+                <a:gd name="connsiteX2" fmla="*/ 479425 w 479425"/>
+                <a:gd name="connsiteY2" fmla="*/ 361950 h 361950"/>
+              </a:gdLst>
+              <a:ahLst/>
+              <a:cxnLst>
+                <a:cxn ang="0">
+                  <a:pos x="connsiteX0" y="connsiteY0"/>
+                </a:cxn>
+                <a:cxn ang="0">
+                  <a:pos x="connsiteX1" y="connsiteY1"/>
+                </a:cxn>
+                <a:cxn ang="0">
+                  <a:pos x="connsiteX2" y="connsiteY2"/>
+                </a:cxn>
+              </a:cxnLst>
+              <a:rect l="l" t="t" r="r" b="b"/>
+              <a:pathLst>
+                <a:path w="479425" h="361950">
+                  <a:moveTo>
+                    <a:pt x="0" y="355600"/>
+                  </a:moveTo>
+                  <a:lnTo>
+                    <a:pt x="241300" y="0"/>
+                  </a:lnTo>
+                  <a:lnTo>
+                    <a:pt x="479425" y="361950"/>
+                  </a:lnTo>
+                </a:path>
+              </a:pathLst>
+            </a:custGeom>
+            <a:noFill/>
+            <a:ln w="28575">
+              <a:solidFill>
+                <a:schemeClr val="tx1"/>
+              </a:solidFill>
+            </a:ln>
+            <a:effectLst/>
+          </p:spPr>
+          <p:style>
+            <a:lnRef idx="1">
+              <a:schemeClr val="accent4"/>
+            </a:lnRef>
+            <a:fillRef idx="2">
+              <a:schemeClr val="accent4"/>
+            </a:fillRef>
+            <a:effectRef idx="1">
+              <a:schemeClr val="accent4"/>
+            </a:effectRef>
+            <a:fontRef idx="minor">
+              <a:schemeClr val="dk1"/>
+            </a:fontRef>
+          </p:style>
+          <p:txBody>
+            <a:bodyPr rtlCol="0" anchor="ctr"/>
+            <a:lstStyle/>
+            <a:p>
+              <a:pPr algn="ctr"/>
+              <a:endParaRPr lang="en-SG"/>
+            </a:p>
+          </p:txBody>
+        </p:sp>
+        <p:cxnSp>
+          <p:nvCxnSpPr>
+            <p:cNvPr id="11" name="Straight Connector 10"/>
+            <p:cNvCxnSpPr/>
+            <p:nvPr/>
+          </p:nvCxnSpPr>
+          <p:spPr>
+            <a:xfrm>
+              <a:off x="3239901" y="4509120"/>
+              <a:ext cx="648072" cy="0"/>
+            </a:xfrm>
+            <a:prstGeom prst="line">
+              <a:avLst/>
+            </a:prstGeom>
+            <a:ln w="28575">
+              <a:solidFill>
+                <a:schemeClr val="tx1"/>
+              </a:solidFill>
+            </a:ln>
+            <a:effectLst/>
+          </p:spPr>
+          <p:style>
+            <a:lnRef idx="1">
+              <a:schemeClr val="accent4"/>
+            </a:lnRef>
+            <a:fillRef idx="2">
+              <a:schemeClr val="accent4"/>
+            </a:fillRef>
+            <a:effectRef idx="1">
+              <a:schemeClr val="accent4"/>
+            </a:effectRef>
+            <a:fontRef idx="minor">
+              <a:schemeClr val="dk1"/>
+            </a:fontRef>
+          </p:style>
+        </p:cxnSp>
+      </p:grpSp>
+      <p:sp>
+        <p:nvSpPr>
+          <p:cNvPr id="16" name="Rectangle 62"/>
+          <p:cNvSpPr/>
+          <p:nvPr/>
+        </p:nvSpPr>
+        <p:spPr>
+          <a:xfrm>
+            <a:off x="3335583" y="611613"/>
+            <a:ext cx="1093635" cy="346760"/>
+          </a:xfrm>
+          <a:prstGeom prst="rect">
+            <a:avLst/>
+          </a:prstGeom>
+          <a:solidFill>
+            <a:srgbClr val="0070C0"/>
+          </a:solidFill>
+          <a:ln w="19050">
+            <a:solidFill>
+              <a:srgbClr val="0070C0"/>
+            </a:solidFill>
+          </a:ln>
+          <a:effectLst/>
+        </p:spPr>
+        <p:style>
+          <a:lnRef idx="1">
+            <a:schemeClr val="accent2"/>
+          </a:lnRef>
+          <a:fillRef idx="2">
+            <a:schemeClr val="accent2"/>
+          </a:fillRef>
+          <a:effectRef idx="1">
+            <a:schemeClr val="accent2"/>
+          </a:effectRef>
+          <a:fontRef idx="minor">
+            <a:schemeClr val="dk1"/>
+          </a:fontRef>
+        </p:style>
+        <p:txBody>
+          <a:bodyPr rtlCol="0" anchor="ctr"/>
+          <a:lstStyle/>
+          <a:p>
+            <a:pPr algn="ctr"/>
+            <a:r>
+              <a:rPr lang="en-US" sz="1600" dirty="0">
+                <a:solidFill>
+                  <a:schemeClr val="bg1"/>
+                </a:solidFill>
+              </a:rPr>
+              <a:t>:Logic</a:t>
+            </a:r>
+            <a:endParaRPr lang="en-SG" sz="1600" dirty="0">
+              <a:solidFill>
+                <a:schemeClr val="bg1"/>
+              </a:solidFill>
+            </a:endParaRPr>
+          </a:p>
+        </p:txBody>
+      </p:sp>
+      <p:cxnSp>
+        <p:nvCxnSpPr>
+          <p:cNvPr id="17" name="Straight Connector 16"/>
+          <p:cNvCxnSpPr/>
+          <p:nvPr/>
+        </p:nvCxnSpPr>
+        <p:spPr>
+          <a:xfrm>
+            <a:off x="3882400" y="975284"/>
+            <a:ext cx="0" cy="1723059"/>
+          </a:xfrm>
+          <a:prstGeom prst="line">
+            <a:avLst/>
+          </a:prstGeom>
+          <a:ln w="19050">
+            <a:solidFill>
+              <a:srgbClr val="0070C0"/>
+            </a:solidFill>
+            <a:prstDash val="sysDash"/>
+          </a:ln>
+          <a:effectLst/>
+        </p:spPr>
+        <p:style>
+          <a:lnRef idx="1">
+            <a:schemeClr val="accent1"/>
+          </a:lnRef>
+          <a:fillRef idx="2">
+            <a:schemeClr val="accent1"/>
+          </a:fillRef>
+          <a:effectRef idx="1">
+            <a:schemeClr val="accent1"/>
+          </a:effectRef>
+          <a:fontRef idx="minor">
+            <a:schemeClr val="dk1"/>
+          </a:fontRef>
+        </p:style>
+      </p:cxnSp>
+      <p:sp>
+        <p:nvSpPr>
+          <p:cNvPr id="18" name="Rectangle 17"/>
+          <p:cNvSpPr/>
+          <p:nvPr/>
+        </p:nvSpPr>
+        <p:spPr>
+          <a:xfrm>
+            <a:off x="3810392" y="1433477"/>
+            <a:ext cx="144016" cy="832525"/>
+          </a:xfrm>
+          <a:prstGeom prst="rect">
+            <a:avLst/>
+          </a:prstGeom>
+          <a:solidFill>
+            <a:srgbClr val="0070C0"/>
+          </a:solidFill>
+          <a:ln>
+            <a:solidFill>
+              <a:srgbClr val="0070C0"/>
+            </a:solidFill>
+          </a:ln>
+          <a:effectLst/>
+        </p:spPr>
+        <p:style>
+          <a:lnRef idx="1">
+            <a:schemeClr val="accent3"/>
+          </a:lnRef>
+          <a:fillRef idx="2">
+            <a:schemeClr val="accent3"/>
+          </a:fillRef>
+          <a:effectRef idx="1">
+            <a:schemeClr val="accent3"/>
+          </a:effectRef>
+          <a:fontRef idx="minor">
+            <a:schemeClr val="dk1"/>
+          </a:fontRef>
+        </p:style>
+        <p:txBody>
+          <a:bodyPr rtlCol="0" anchor="ctr"/>
+          <a:lstStyle/>
+          <a:p>
+            <a:pPr algn="ctr"/>
+            <a:endParaRPr lang="en-SG" sz="1400">
+              <a:solidFill>
+                <a:schemeClr val="dk1"/>
+              </a:solidFill>
+            </a:endParaRPr>
+          </a:p>
+        </p:txBody>
+      </p:sp>
+      <p:sp>
+        <p:nvSpPr>
+          <p:cNvPr id="19" name="Rectangle 62"/>
+          <p:cNvSpPr/>
+          <p:nvPr/>
+        </p:nvSpPr>
+        <p:spPr>
+          <a:xfrm>
+            <a:off x="5316783" y="607926"/>
+            <a:ext cx="1093635" cy="346760"/>
+          </a:xfrm>
+          <a:prstGeom prst="rect">
+            <a:avLst/>
+          </a:prstGeom>
+          <a:solidFill>
+            <a:srgbClr val="7030A0"/>
+          </a:solidFill>
+          <a:ln w="19050">
+            <a:solidFill>
+              <a:srgbClr val="7030A0"/>
+            </a:solidFill>
+          </a:ln>
+          <a:effectLst/>
+        </p:spPr>
+        <p:style>
+          <a:lnRef idx="1">
+            <a:schemeClr val="accent2"/>
+          </a:lnRef>
+          <a:fillRef idx="2">
+            <a:schemeClr val="accent2"/>
+          </a:fillRef>
+          <a:effectRef idx="1">
+            <a:schemeClr val="accent2"/>
+          </a:effectRef>
+          <a:fontRef idx="minor">
+            <a:schemeClr val="dk1"/>
+          </a:fontRef>
+        </p:style>
+        <p:txBody>
+          <a:bodyPr rtlCol="0" anchor="ctr"/>
+          <a:lstStyle/>
+          <a:p>
+            <a:pPr algn="ctr"/>
+            <a:r>
+              <a:rPr lang="en-US" sz="1600" dirty="0">
+                <a:solidFill>
+                  <a:schemeClr val="bg1"/>
+                </a:solidFill>
+              </a:rPr>
+              <a:t>:Model</a:t>
+            </a:r>
+            <a:endParaRPr lang="en-SG" sz="1600" dirty="0">
+              <a:solidFill>
+                <a:schemeClr val="bg1"/>
+              </a:solidFill>
+            </a:endParaRPr>
+          </a:p>
+        </p:txBody>
+      </p:sp>
+      <p:cxnSp>
+        <p:nvCxnSpPr>
+          <p:cNvPr id="20" name="Straight Connector 19"/>
+          <p:cNvCxnSpPr/>
+          <p:nvPr/>
+        </p:nvCxnSpPr>
+        <p:spPr>
+          <a:xfrm>
+            <a:off x="5863600" y="971597"/>
+            <a:ext cx="0" cy="1723059"/>
+          </a:xfrm>
+          <a:prstGeom prst="line">
+            <a:avLst/>
+          </a:prstGeom>
+          <a:ln w="19050">
+            <a:solidFill>
+              <a:srgbClr val="7030A0"/>
+            </a:solidFill>
+            <a:prstDash val="sysDash"/>
+          </a:ln>
+          <a:effectLst/>
+        </p:spPr>
+        <p:style>
+          <a:lnRef idx="1">
+            <a:schemeClr val="accent1"/>
+          </a:lnRef>
+          <a:fillRef idx="2">
+            <a:schemeClr val="accent1"/>
+          </a:fillRef>
+          <a:effectRef idx="1">
+            <a:schemeClr val="accent1"/>
+          </a:effectRef>
+          <a:fontRef idx="minor">
+            <a:schemeClr val="dk1"/>
+          </a:fontRef>
+        </p:style>
+      </p:cxnSp>
+      <p:sp>
+        <p:nvSpPr>
+          <p:cNvPr id="21" name="Rectangle 20"/>
+          <p:cNvSpPr/>
+          <p:nvPr/>
+        </p:nvSpPr>
+        <p:spPr>
+          <a:xfrm>
+            <a:off x="5791592" y="1538408"/>
+            <a:ext cx="142006" cy="651394"/>
+          </a:xfrm>
+          <a:prstGeom prst="rect">
+            <a:avLst/>
+          </a:prstGeom>
+          <a:solidFill>
+            <a:srgbClr val="7030A0"/>
+          </a:solidFill>
+          <a:ln>
+            <a:solidFill>
+              <a:srgbClr val="7030A0"/>
+            </a:solidFill>
+          </a:ln>
+          <a:effectLst/>
+        </p:spPr>
+        <p:style>
+          <a:lnRef idx="1">
+            <a:schemeClr val="accent3"/>
+          </a:lnRef>
+          <a:fillRef idx="2">
+            <a:schemeClr val="accent3"/>
+          </a:fillRef>
+          <a:effectRef idx="1">
+            <a:schemeClr val="accent3"/>
+          </a:effectRef>
+          <a:fontRef idx="minor">
+            <a:schemeClr val="dk1"/>
+          </a:fontRef>
+        </p:style>
+        <p:txBody>
+          <a:bodyPr rtlCol="0" anchor="ctr"/>
+          <a:lstStyle/>
+          <a:p>
+            <a:pPr algn="ctr"/>
+            <a:endParaRPr lang="en-SG" sz="1400">
+              <a:solidFill>
+                <a:schemeClr val="dk1"/>
+              </a:solidFill>
+            </a:endParaRPr>
+          </a:p>
+        </p:txBody>
+      </p:sp>
+      <p:cxnSp>
+        <p:nvCxnSpPr>
+          <p:cNvPr id="23" name="Straight Arrow Connector 22"/>
+          <p:cNvCxnSpPr/>
+          <p:nvPr/>
+        </p:nvCxnSpPr>
+        <p:spPr>
+          <a:xfrm>
+            <a:off x="466818" y="1325979"/>
+            <a:ext cx="1119851" cy="0"/>
+          </a:xfrm>
+          <a:prstGeom prst="straightConnector1">
+            <a:avLst/>
+          </a:prstGeom>
+          <a:ln w="19050">
+            <a:solidFill>
+              <a:schemeClr val="tx1"/>
+            </a:solidFill>
+            <a:tailEnd type="arrow"/>
+          </a:ln>
+        </p:spPr>
+        <p:style>
+          <a:lnRef idx="1">
+            <a:schemeClr val="accent1"/>
+          </a:lnRef>
+          <a:fillRef idx="0">
+            <a:schemeClr val="accent1"/>
+          </a:fillRef>
+          <a:effectRef idx="0">
+            <a:schemeClr val="accent1"/>
+          </a:effectRef>
+          <a:fontRef idx="minor">
+            <a:schemeClr val="tx1"/>
+          </a:fontRef>
+        </p:style>
+      </p:cxnSp>
+      <p:sp>
+        <p:nvSpPr>
+          <p:cNvPr id="24" name="TextBox 23"/>
+          <p:cNvSpPr txBox="1"/>
+          <p:nvPr/>
+        </p:nvSpPr>
+        <p:spPr>
+          <a:xfrm>
+            <a:off x="473010" y="1371193"/>
+            <a:ext cx="1065810" cy="430887"/>
+          </a:xfrm>
+          <a:prstGeom prst="rect">
+            <a:avLst/>
+          </a:prstGeom>
+          <a:noFill/>
+        </p:spPr>
+        <p:txBody>
+          <a:bodyPr wrap="square" lIns="0" tIns="0" rIns="0" bIns="0" rtlCol="0">
+            <a:spAutoFit/>
+          </a:bodyPr>
+          <a:lstStyle/>
+          <a:p>
+            <a:r>
+              <a:rPr lang="en-US" sz="1400" dirty="0" err="1"/>
+              <a:t>loadtemplate</a:t>
+            </a:r>
+            <a:r>
+              <a:rPr lang="en-US" sz="1400" dirty="0"/>
+              <a:t> template1.txt</a:t>
+            </a:r>
+          </a:p>
+        </p:txBody>
+      </p:sp>
+      <p:cxnSp>
+        <p:nvCxnSpPr>
+          <p:cNvPr id="25" name="Straight Arrow Connector 24"/>
+          <p:cNvCxnSpPr/>
+          <p:nvPr/>
+        </p:nvCxnSpPr>
+        <p:spPr>
+          <a:xfrm>
+            <a:off x="1739069" y="1433478"/>
+            <a:ext cx="2071323" cy="0"/>
+          </a:xfrm>
+          <a:prstGeom prst="straightConnector1">
+            <a:avLst/>
+          </a:prstGeom>
+          <a:ln w="19050">
+            <a:solidFill>
+              <a:srgbClr val="00B050"/>
+            </a:solidFill>
+            <a:tailEnd type="arrow"/>
+          </a:ln>
+        </p:spPr>
+        <p:style>
+          <a:lnRef idx="1">
+            <a:schemeClr val="accent1"/>
+          </a:lnRef>
+          <a:fillRef idx="0">
+            <a:schemeClr val="accent1"/>
+          </a:fillRef>
+          <a:effectRef idx="0">
+            <a:schemeClr val="accent1"/>
+          </a:effectRef>
+          <a:fontRef idx="minor">
+            <a:schemeClr val="tx1"/>
+          </a:fontRef>
+        </p:style>
+      </p:cxnSp>
+      <p:sp>
+        <p:nvSpPr>
+          <p:cNvPr id="26" name="TextBox 25"/>
+          <p:cNvSpPr txBox="1"/>
+          <p:nvPr/>
+        </p:nvSpPr>
+        <p:spPr>
+          <a:xfrm>
+            <a:off x="1824281" y="1506676"/>
+            <a:ext cx="1905719" cy="430887"/>
+          </a:xfrm>
+          <a:prstGeom prst="rect">
+            <a:avLst/>
+          </a:prstGeom>
+          <a:noFill/>
+        </p:spPr>
+        <p:txBody>
+          <a:bodyPr wrap="square" lIns="0" tIns="0" rIns="0" bIns="0" rtlCol="0">
+            <a:spAutoFit/>
+          </a:bodyPr>
+          <a:lstStyle/>
+          <a:p>
+            <a:r>
+              <a:rPr lang="en-US" sz="1400" dirty="0">
+                <a:solidFill>
+                  <a:srgbClr val="0070C0"/>
+                </a:solidFill>
+              </a:rPr>
+              <a:t>execute(“</a:t>
+            </a:r>
+            <a:r>
+              <a:rPr lang="en-US" sz="1400" dirty="0" err="1">
+                <a:solidFill>
+                  <a:srgbClr val="0070C0"/>
+                </a:solidFill>
+              </a:rPr>
+              <a:t>loadtemplate</a:t>
+            </a:r>
+            <a:r>
+              <a:rPr lang="en-US" sz="1400" dirty="0">
+                <a:solidFill>
+                  <a:srgbClr val="0070C0"/>
+                </a:solidFill>
+              </a:rPr>
+              <a:t> template1.txt”)</a:t>
+            </a:r>
+          </a:p>
+        </p:txBody>
+      </p:sp>
+      <p:cxnSp>
+        <p:nvCxnSpPr>
+          <p:cNvPr id="28" name="Straight Arrow Connector 27"/>
+          <p:cNvCxnSpPr/>
+          <p:nvPr/>
+        </p:nvCxnSpPr>
+        <p:spPr>
+          <a:xfrm>
+            <a:off x="3954408" y="1538409"/>
+            <a:ext cx="1837184" cy="0"/>
+          </a:xfrm>
+          <a:prstGeom prst="straightConnector1">
+            <a:avLst/>
+          </a:prstGeom>
+          <a:ln w="19050">
+            <a:solidFill>
+              <a:srgbClr val="0070C0"/>
+            </a:solidFill>
+            <a:tailEnd type="arrow"/>
+          </a:ln>
+        </p:spPr>
+        <p:style>
+          <a:lnRef idx="1">
+            <a:schemeClr val="accent1"/>
+          </a:lnRef>
+          <a:fillRef idx="0">
+            <a:schemeClr val="accent1"/>
+          </a:fillRef>
+          <a:effectRef idx="0">
+            <a:schemeClr val="accent1"/>
+          </a:effectRef>
+          <a:fontRef idx="minor">
+            <a:schemeClr val="tx1"/>
+          </a:fontRef>
+        </p:style>
+      </p:cxnSp>
+      <p:sp>
+        <p:nvSpPr>
+          <p:cNvPr id="29" name="TextBox 28"/>
+          <p:cNvSpPr txBox="1"/>
+          <p:nvPr/>
+        </p:nvSpPr>
+        <p:spPr>
+          <a:xfrm>
+            <a:off x="4058780" y="1542583"/>
+            <a:ext cx="1665838" cy="215444"/>
+          </a:xfrm>
+          <a:prstGeom prst="rect">
+            <a:avLst/>
+          </a:prstGeom>
+          <a:noFill/>
+        </p:spPr>
+        <p:txBody>
+          <a:bodyPr wrap="square" lIns="0" tIns="0" rIns="0" bIns="0" rtlCol="0">
+            <a:spAutoFit/>
+          </a:bodyPr>
+          <a:lstStyle/>
+          <a:p>
+            <a:r>
+              <a:rPr lang="en-US" sz="1400" dirty="0" err="1">
+                <a:solidFill>
+                  <a:srgbClr val="7030A0"/>
+                </a:solidFill>
+              </a:rPr>
+              <a:t>loadtemplate</a:t>
+            </a:r>
+            <a:r>
+              <a:rPr lang="en-US" sz="1400" dirty="0">
+                <a:solidFill>
+                  <a:srgbClr val="7030A0"/>
+                </a:solidFill>
+              </a:rPr>
+              <a:t>(</a:t>
+            </a:r>
+            <a:r>
+              <a:rPr lang="en-US" sz="1400" dirty="0" err="1">
+                <a:solidFill>
+                  <a:srgbClr val="7030A0"/>
+                </a:solidFill>
+              </a:rPr>
+              <a:t>filepath</a:t>
+            </a:r>
+            <a:r>
+              <a:rPr lang="en-US" sz="1400" dirty="0">
+                <a:solidFill>
+                  <a:srgbClr val="7030A0"/>
+                </a:solidFill>
+              </a:rPr>
+              <a:t>)</a:t>
+            </a:r>
+          </a:p>
+        </p:txBody>
+      </p:sp>
+      <p:sp>
+        <p:nvSpPr>
+          <p:cNvPr id="33" name="TextBox 32"/>
+          <p:cNvSpPr txBox="1"/>
+          <p:nvPr/>
+        </p:nvSpPr>
+        <p:spPr>
+          <a:xfrm>
+            <a:off x="6028291" y="1687656"/>
+            <a:ext cx="2658509" cy="215444"/>
+          </a:xfrm>
+          <a:prstGeom prst="rect">
+            <a:avLst/>
+          </a:prstGeom>
+          <a:noFill/>
+        </p:spPr>
+        <p:txBody>
+          <a:bodyPr wrap="square" lIns="0" tIns="0" rIns="0" bIns="0" rtlCol="0">
+            <a:spAutoFit/>
+          </a:bodyPr>
+          <a:lstStyle/>
+          <a:p>
+            <a:r>
+              <a:rPr lang="en-US" sz="1400" dirty="0">
+                <a:solidFill>
+                  <a:schemeClr val="accent5">
+                    <a:lumMod val="75000"/>
+                  </a:schemeClr>
+                </a:solidFill>
+              </a:rPr>
+              <a:t>post(</a:t>
+            </a:r>
+            <a:r>
+              <a:rPr lang="en-US" sz="1400" dirty="0" err="1">
+                <a:solidFill>
+                  <a:schemeClr val="accent5">
+                    <a:lumMod val="75000"/>
+                  </a:schemeClr>
+                </a:solidFill>
+              </a:rPr>
+              <a:t>TemplateLoadRequestedEvent</a:t>
+            </a:r>
+            <a:r>
+              <a:rPr lang="en-US" sz="1400" dirty="0">
+                <a:solidFill>
+                  <a:schemeClr val="accent5">
+                    <a:lumMod val="75000"/>
+                  </a:schemeClr>
+                </a:solidFill>
+              </a:rPr>
+              <a:t>)</a:t>
+            </a:r>
+          </a:p>
+        </p:txBody>
+      </p:sp>
+      <p:cxnSp>
+        <p:nvCxnSpPr>
+          <p:cNvPr id="34" name="Straight Arrow Connector 33"/>
+          <p:cNvCxnSpPr/>
+          <p:nvPr/>
+        </p:nvCxnSpPr>
+        <p:spPr>
+          <a:xfrm>
+            <a:off x="3954408" y="2190681"/>
+            <a:ext cx="1837184" cy="0"/>
+          </a:xfrm>
+          <a:prstGeom prst="straightConnector1">
+            <a:avLst/>
+          </a:prstGeom>
+          <a:ln w="19050">
+            <a:solidFill>
+              <a:srgbClr val="7030A0"/>
+            </a:solidFill>
+            <a:prstDash val="sysDash"/>
+            <a:headEnd type="arrow" w="med" len="med"/>
+            <a:tailEnd type="none" w="med" len="med"/>
+          </a:ln>
+        </p:spPr>
+        <p:style>
+          <a:lnRef idx="1">
+            <a:schemeClr val="accent1"/>
+          </a:lnRef>
+          <a:fillRef idx="0">
+            <a:schemeClr val="accent1"/>
+          </a:fillRef>
+          <a:effectRef idx="0">
+            <a:schemeClr val="accent1"/>
+          </a:effectRef>
+          <a:fontRef idx="minor">
+            <a:schemeClr val="tx1"/>
+          </a:fontRef>
+        </p:style>
+      </p:cxnSp>
+      <p:cxnSp>
+        <p:nvCxnSpPr>
+          <p:cNvPr id="35" name="Straight Arrow Connector 34"/>
+          <p:cNvCxnSpPr/>
+          <p:nvPr/>
+        </p:nvCxnSpPr>
+        <p:spPr>
+          <a:xfrm>
+            <a:off x="1739069" y="2266002"/>
+            <a:ext cx="2058118" cy="0"/>
+          </a:xfrm>
+          <a:prstGeom prst="straightConnector1">
+            <a:avLst/>
+          </a:prstGeom>
+          <a:ln w="19050">
+            <a:solidFill>
+              <a:srgbClr val="0070C0"/>
+            </a:solidFill>
+            <a:prstDash val="sysDash"/>
+            <a:headEnd type="arrow" w="med" len="med"/>
+            <a:tailEnd type="none" w="med" len="med"/>
+          </a:ln>
+        </p:spPr>
+        <p:style>
+          <a:lnRef idx="1">
+            <a:schemeClr val="accent1"/>
+          </a:lnRef>
+          <a:fillRef idx="0">
+            <a:schemeClr val="accent1"/>
+          </a:fillRef>
+          <a:effectRef idx="0">
+            <a:schemeClr val="accent1"/>
+          </a:effectRef>
+          <a:fontRef idx="minor">
+            <a:schemeClr val="tx1"/>
+          </a:fontRef>
+        </p:style>
+      </p:cxnSp>
+      <p:cxnSp>
+        <p:nvCxnSpPr>
+          <p:cNvPr id="37" name="Straight Arrow Connector 36"/>
+          <p:cNvCxnSpPr/>
+          <p:nvPr/>
+        </p:nvCxnSpPr>
+        <p:spPr>
+          <a:xfrm>
+            <a:off x="390618" y="2342202"/>
+            <a:ext cx="1196051" cy="0"/>
+          </a:xfrm>
+          <a:prstGeom prst="straightConnector1">
+            <a:avLst/>
+          </a:prstGeom>
+          <a:ln w="19050">
+            <a:solidFill>
+              <a:srgbClr val="00B050"/>
+            </a:solidFill>
+            <a:prstDash val="sysDash"/>
+            <a:headEnd type="arrow" w="med" len="med"/>
+            <a:tailEnd type="none" w="med" len="med"/>
+          </a:ln>
+        </p:spPr>
+        <p:style>
+          <a:lnRef idx="1">
+            <a:schemeClr val="accent1"/>
+          </a:lnRef>
+          <a:fillRef idx="0">
+            <a:schemeClr val="accent1"/>
+          </a:fillRef>
+          <a:effectRef idx="0">
+            <a:schemeClr val="accent1"/>
+          </a:effectRef>
+          <a:fontRef idx="minor">
+            <a:schemeClr val="tx1"/>
+          </a:fontRef>
+        </p:style>
+      </p:cxnSp>
+      <p:sp>
+        <p:nvSpPr>
+          <p:cNvPr id="39" name="Rectangle 62"/>
+          <p:cNvSpPr/>
+          <p:nvPr/>
+        </p:nvSpPr>
+        <p:spPr>
+          <a:xfrm>
+            <a:off x="7772400" y="591251"/>
+            <a:ext cx="1371600" cy="346760"/>
+          </a:xfrm>
+          <a:prstGeom prst="rect">
+            <a:avLst/>
+          </a:prstGeom>
+          <a:solidFill>
+            <a:schemeClr val="accent5">
+              <a:lumMod val="75000"/>
+            </a:schemeClr>
+          </a:solidFill>
+          <a:ln w="19050">
+            <a:solidFill>
+              <a:schemeClr val="accent5">
+                <a:lumMod val="75000"/>
+              </a:schemeClr>
+            </a:solidFill>
+          </a:ln>
+          <a:effectLst/>
+        </p:spPr>
+        <p:style>
+          <a:lnRef idx="1">
+            <a:schemeClr val="accent2"/>
+          </a:lnRef>
+          <a:fillRef idx="2">
+            <a:schemeClr val="accent2"/>
+          </a:fillRef>
+          <a:effectRef idx="1">
+            <a:schemeClr val="accent2"/>
+          </a:effectRef>
+          <a:fontRef idx="minor">
+            <a:schemeClr val="dk1"/>
+          </a:fontRef>
+        </p:style>
+        <p:txBody>
+          <a:bodyPr rtlCol="0" anchor="ctr"/>
+          <a:lstStyle/>
+          <a:p>
+            <a:pPr algn="ctr"/>
+            <a:r>
+              <a:rPr lang="en-US" sz="1600" dirty="0">
+                <a:solidFill>
+                  <a:schemeClr val="bg1"/>
+                </a:solidFill>
+              </a:rPr>
+              <a:t>:</a:t>
+            </a:r>
+            <a:r>
+              <a:rPr lang="en-US" sz="1600" dirty="0" err="1">
+                <a:solidFill>
+                  <a:schemeClr val="bg1"/>
+                </a:solidFill>
+              </a:rPr>
+              <a:t>EventsCenter</a:t>
+            </a:r>
+            <a:endParaRPr lang="en-SG" sz="1600" dirty="0">
+              <a:solidFill>
+                <a:schemeClr val="bg1"/>
+              </a:solidFill>
+            </a:endParaRPr>
+          </a:p>
+        </p:txBody>
+      </p:sp>
+      <p:cxnSp>
+        <p:nvCxnSpPr>
+          <p:cNvPr id="40" name="Straight Connector 39"/>
+          <p:cNvCxnSpPr/>
+          <p:nvPr/>
+        </p:nvCxnSpPr>
+        <p:spPr>
+          <a:xfrm>
+            <a:off x="8693002" y="944305"/>
+            <a:ext cx="0" cy="1723059"/>
+          </a:xfrm>
+          <a:prstGeom prst="line">
+            <a:avLst/>
+          </a:prstGeom>
+          <a:ln w="19050">
+            <a:solidFill>
+              <a:schemeClr val="accent5">
+                <a:lumMod val="75000"/>
+              </a:schemeClr>
+            </a:solidFill>
+            <a:prstDash val="sysDash"/>
+          </a:ln>
+          <a:effectLst/>
+        </p:spPr>
+        <p:style>
+          <a:lnRef idx="1">
+            <a:schemeClr val="accent1"/>
+          </a:lnRef>
+          <a:fillRef idx="2">
+            <a:schemeClr val="accent1"/>
+          </a:fillRef>
+          <a:effectRef idx="1">
+            <a:schemeClr val="accent1"/>
+          </a:effectRef>
+          <a:fontRef idx="minor">
+            <a:schemeClr val="dk1"/>
+          </a:fontRef>
+        </p:style>
+      </p:cxnSp>
+      <p:sp>
+        <p:nvSpPr>
+          <p:cNvPr id="41" name="Rectangle 40"/>
+          <p:cNvSpPr/>
+          <p:nvPr/>
+        </p:nvSpPr>
+        <p:spPr>
+          <a:xfrm>
+            <a:off x="8620994" y="1961202"/>
+            <a:ext cx="142006" cy="176787"/>
+          </a:xfrm>
+          <a:prstGeom prst="rect">
+            <a:avLst/>
+          </a:prstGeom>
+          <a:solidFill>
+            <a:schemeClr val="accent5">
+              <a:lumMod val="75000"/>
+            </a:schemeClr>
+          </a:solidFill>
+          <a:ln>
+            <a:solidFill>
+              <a:schemeClr val="accent5">
+                <a:lumMod val="75000"/>
+              </a:schemeClr>
+            </a:solidFill>
+          </a:ln>
+          <a:effectLst/>
+        </p:spPr>
+        <p:style>
+          <a:lnRef idx="1">
+            <a:schemeClr val="accent3"/>
+          </a:lnRef>
+          <a:fillRef idx="2">
+            <a:schemeClr val="accent3"/>
+          </a:fillRef>
+          <a:effectRef idx="1">
+            <a:schemeClr val="accent3"/>
+          </a:effectRef>
+          <a:fontRef idx="minor">
+            <a:schemeClr val="dk1"/>
+          </a:fontRef>
+        </p:style>
+        <p:txBody>
+          <a:bodyPr rtlCol="0" anchor="ctr"/>
+          <a:lstStyle/>
+          <a:p>
+            <a:pPr algn="ctr"/>
+            <a:endParaRPr lang="en-SG" sz="1400">
+              <a:solidFill>
+                <a:schemeClr val="dk1"/>
+              </a:solidFill>
+            </a:endParaRPr>
+          </a:p>
+        </p:txBody>
+      </p:sp>
+      <p:cxnSp>
+        <p:nvCxnSpPr>
+          <p:cNvPr id="42" name="Straight Arrow Connector 41"/>
+          <p:cNvCxnSpPr/>
+          <p:nvPr/>
+        </p:nvCxnSpPr>
+        <p:spPr>
+          <a:xfrm>
+            <a:off x="5943992" y="1961202"/>
+            <a:ext cx="2568438" cy="0"/>
+          </a:xfrm>
+          <a:prstGeom prst="straightConnector1">
+            <a:avLst/>
+          </a:prstGeom>
+          <a:ln w="19050">
+            <a:solidFill>
+              <a:srgbClr val="7030A0"/>
+            </a:solidFill>
+            <a:tailEnd type="arrow"/>
+          </a:ln>
+        </p:spPr>
+        <p:style>
+          <a:lnRef idx="1">
+            <a:schemeClr val="accent1"/>
+          </a:lnRef>
+          <a:fillRef idx="0">
+            <a:schemeClr val="accent1"/>
+          </a:fillRef>
+          <a:effectRef idx="0">
+            <a:schemeClr val="accent1"/>
+          </a:effectRef>
+          <a:fontRef idx="minor">
+            <a:schemeClr val="tx1"/>
+          </a:fontRef>
+        </p:style>
+      </p:cxnSp>
+      <p:cxnSp>
+        <p:nvCxnSpPr>
+          <p:cNvPr id="44" name="Straight Arrow Connector 43"/>
+          <p:cNvCxnSpPr>
+            <a:cxnSpLocks/>
+            <a:endCxn id="41" idx="2"/>
+          </p:cNvCxnSpPr>
+          <p:nvPr/>
+        </p:nvCxnSpPr>
+        <p:spPr>
+          <a:xfrm>
+            <a:off x="5943992" y="2137989"/>
+            <a:ext cx="2748005" cy="0"/>
+          </a:xfrm>
+          <a:prstGeom prst="straightConnector1">
+            <a:avLst/>
+          </a:prstGeom>
+          <a:ln w="19050">
+            <a:solidFill>
+              <a:schemeClr val="accent5">
+                <a:lumMod val="75000"/>
+              </a:schemeClr>
+            </a:solidFill>
+            <a:prstDash val="sysDash"/>
+            <a:headEnd type="arrow" w="med" len="med"/>
+            <a:tailEnd type="none" w="med" len="med"/>
+          </a:ln>
+        </p:spPr>
+        <p:style>
+          <a:lnRef idx="1">
+            <a:schemeClr val="accent1"/>
+          </a:lnRef>
+          <a:fillRef idx="0">
+            <a:schemeClr val="accent1"/>
+          </a:fillRef>
+          <a:effectRef idx="0">
+            <a:schemeClr val="accent1"/>
+          </a:effectRef>
+          <a:fontRef idx="minor">
+            <a:schemeClr val="tx1"/>
+          </a:fontRef>
+        </p:style>
+      </p:cxnSp>
+      <p:cxnSp>
+        <p:nvCxnSpPr>
+          <p:cNvPr id="85" name="Straight Connector 84"/>
+          <p:cNvCxnSpPr/>
+          <p:nvPr/>
+        </p:nvCxnSpPr>
+        <p:spPr>
+          <a:xfrm flipH="1">
+            <a:off x="314394" y="1099672"/>
+            <a:ext cx="24" cy="1598671"/>
+          </a:xfrm>
+          <a:prstGeom prst="line">
+            <a:avLst/>
+          </a:prstGeom>
+          <a:ln w="19050">
+            <a:solidFill>
+              <a:schemeClr val="tx1"/>
+            </a:solidFill>
+            <a:prstDash val="sysDash"/>
+          </a:ln>
+          <a:effectLst/>
+        </p:spPr>
+        <p:style>
+          <a:lnRef idx="1">
+            <a:schemeClr val="accent1"/>
+          </a:lnRef>
+          <a:fillRef idx="2">
+            <a:schemeClr val="accent1"/>
+          </a:fillRef>
+          <a:effectRef idx="1">
+            <a:schemeClr val="accent1"/>
+          </a:effectRef>
+          <a:fontRef idx="minor">
+            <a:schemeClr val="dk1"/>
+          </a:fontRef>
+        </p:style>
+      </p:cxnSp>
+    </p:spTree>
+    <p:extLst>
+      <p:ext uri="{BB962C8B-B14F-4D97-AF65-F5344CB8AC3E}">
+        <p14:creationId xmlns:p14="http://schemas.microsoft.com/office/powerpoint/2010/main" val="2595471911"/>
+      </p:ext>
+    </p:extLst>
+  </p:cSld>
+  <p:clrMapOvr>
+    <a:masterClrMapping/>
+  </p:clrMapOvr>
+</p:sld>
+</file>
+
+<file path=ppt/slides/slide3.xml><?xml version="1.0" encoding="utf-8"?>
+<p:sld xmlns:a="http://schemas.openxmlformats.org/drawingml/2006/main" xmlns:r="http://schemas.openxmlformats.org/officeDocument/2006/relationships" xmlns:p="http://schemas.openxmlformats.org/presentationml/2006/main">
+  <p:cSld>
+    <p:spTree>
+      <p:nvGrpSpPr>
+        <p:cNvPr id="1" name=""/>
+        <p:cNvGrpSpPr/>
+        <p:nvPr/>
+      </p:nvGrpSpPr>
+      <p:grpSpPr>
+        <a:xfrm>
+          <a:off x="0" y="0"/>
+          <a:ext cx="0" cy="0"/>
+          <a:chOff x="0" y="0"/>
+          <a:chExt cx="0" cy="0"/>
+        </a:xfrm>
+      </p:grpSpPr>
+      <p:sp>
+        <p:nvSpPr>
+          <p:cNvPr id="2" name="Rectangle 62">
+            <a:extLst>
+              <a:ext uri="{FF2B5EF4-FFF2-40B4-BE49-F238E27FC236}">
+                <a16:creationId xmlns:a16="http://schemas.microsoft.com/office/drawing/2014/main" id="{E5090741-091E-4D57-B220-2FC2C7A4FF91}"/>
+              </a:ext>
+            </a:extLst>
+          </p:cNvPr>
+          <p:cNvSpPr/>
+          <p:nvPr/>
+        </p:nvSpPr>
+        <p:spPr>
+          <a:xfrm>
+            <a:off x="7377903" y="592689"/>
+            <a:ext cx="1093635" cy="346760"/>
+          </a:xfrm>
+          <a:prstGeom prst="rect">
+            <a:avLst/>
+          </a:prstGeom>
+          <a:solidFill>
+            <a:schemeClr val="accent6">
+              <a:lumMod val="75000"/>
+            </a:schemeClr>
+          </a:solidFill>
+          <a:ln w="19050">
+            <a:solidFill>
+              <a:schemeClr val="accent6">
+                <a:lumMod val="75000"/>
+              </a:schemeClr>
+            </a:solidFill>
+          </a:ln>
+          <a:effectLst/>
+        </p:spPr>
+        <p:style>
+          <a:lnRef idx="1">
+            <a:schemeClr val="accent2"/>
+          </a:lnRef>
+          <a:fillRef idx="2">
+            <a:schemeClr val="accent2"/>
+          </a:fillRef>
+          <a:effectRef idx="1">
+            <a:schemeClr val="accent2"/>
+          </a:effectRef>
+          <a:fontRef idx="minor">
+            <a:schemeClr val="dk1"/>
+          </a:fontRef>
+        </p:style>
+        <p:txBody>
+          <a:bodyPr rtlCol="0" anchor="ctr"/>
+          <a:lstStyle/>
+          <a:p>
+            <a:pPr algn="ctr"/>
+            <a:r>
+              <a:rPr lang="en-US" sz="1600" dirty="0">
+                <a:solidFill>
+                  <a:schemeClr val="bg1"/>
+                </a:solidFill>
+              </a:rPr>
+              <a:t>:Storage</a:t>
+            </a:r>
+            <a:endParaRPr lang="en-SG" sz="1600" dirty="0">
+              <a:solidFill>
+                <a:schemeClr val="bg1"/>
+              </a:solidFill>
+            </a:endParaRPr>
+          </a:p>
+        </p:txBody>
+      </p:sp>
+      <p:cxnSp>
+        <p:nvCxnSpPr>
+          <p:cNvPr id="3" name="Straight Connector 2">
+            <a:extLst>
+              <a:ext uri="{FF2B5EF4-FFF2-40B4-BE49-F238E27FC236}">
+                <a16:creationId xmlns:a16="http://schemas.microsoft.com/office/drawing/2014/main" id="{8CA45D0E-AA73-4EE4-8819-1A76BC4A8592}"/>
+              </a:ext>
+            </a:extLst>
+          </p:cNvPr>
+          <p:cNvCxnSpPr>
+            <a:cxnSpLocks/>
+          </p:cNvCxnSpPr>
+          <p:nvPr/>
+        </p:nvCxnSpPr>
+        <p:spPr>
+          <a:xfrm>
+            <a:off x="7924720" y="956360"/>
+            <a:ext cx="0" cy="3539440"/>
+          </a:xfrm>
+          <a:prstGeom prst="line">
+            <a:avLst/>
+          </a:prstGeom>
+          <a:ln w="19050">
+            <a:solidFill>
+              <a:schemeClr val="accent6">
+                <a:lumMod val="75000"/>
+              </a:schemeClr>
+            </a:solidFill>
+            <a:prstDash val="sysDash"/>
+          </a:ln>
+          <a:effectLst/>
+        </p:spPr>
+        <p:style>
+          <a:lnRef idx="1">
+            <a:schemeClr val="accent1"/>
+          </a:lnRef>
+          <a:fillRef idx="2">
+            <a:schemeClr val="accent1"/>
+          </a:fillRef>
+          <a:effectRef idx="1">
+            <a:schemeClr val="accent1"/>
+          </a:effectRef>
+          <a:fontRef idx="minor">
+            <a:schemeClr val="dk1"/>
+          </a:fontRef>
+        </p:style>
+      </p:cxnSp>
+      <p:sp>
+        <p:nvSpPr>
+          <p:cNvPr id="4" name="Rectangle 3">
+            <a:extLst>
+              <a:ext uri="{FF2B5EF4-FFF2-40B4-BE49-F238E27FC236}">
+                <a16:creationId xmlns:a16="http://schemas.microsoft.com/office/drawing/2014/main" id="{67ACFF31-8D39-4C18-BD73-7141C49B0AA9}"/>
+              </a:ext>
+            </a:extLst>
+          </p:cNvPr>
+          <p:cNvSpPr/>
+          <p:nvPr/>
+        </p:nvSpPr>
+        <p:spPr>
+          <a:xfrm>
+            <a:off x="7852712" y="1650029"/>
+            <a:ext cx="124478" cy="2159972"/>
+          </a:xfrm>
+          <a:prstGeom prst="rect">
+            <a:avLst/>
+          </a:prstGeom>
+          <a:solidFill>
+            <a:schemeClr val="accent6">
+              <a:lumMod val="75000"/>
+            </a:schemeClr>
+          </a:solidFill>
+          <a:ln>
+            <a:solidFill>
+              <a:schemeClr val="accent6">
+                <a:lumMod val="75000"/>
+              </a:schemeClr>
+            </a:solidFill>
+          </a:ln>
+          <a:effectLst/>
+        </p:spPr>
+        <p:style>
+          <a:lnRef idx="1">
+            <a:schemeClr val="accent3"/>
+          </a:lnRef>
+          <a:fillRef idx="2">
+            <a:schemeClr val="accent3"/>
+          </a:fillRef>
+          <a:effectRef idx="1">
+            <a:schemeClr val="accent3"/>
+          </a:effectRef>
+          <a:fontRef idx="minor">
+            <a:schemeClr val="dk1"/>
+          </a:fontRef>
+        </p:style>
+        <p:txBody>
+          <a:bodyPr rtlCol="0" anchor="ctr"/>
+          <a:lstStyle/>
+          <a:p>
+            <a:pPr algn="ctr"/>
+            <a:endParaRPr lang="en-SG" sz="1400">
+              <a:solidFill>
+                <a:schemeClr val="dk1"/>
+              </a:solidFill>
+            </a:endParaRPr>
+          </a:p>
+        </p:txBody>
+      </p:sp>
+      <p:sp>
+        <p:nvSpPr>
+          <p:cNvPr id="5" name="TextBox 4">
+            <a:extLst>
+              <a:ext uri="{FF2B5EF4-FFF2-40B4-BE49-F238E27FC236}">
+                <a16:creationId xmlns:a16="http://schemas.microsoft.com/office/drawing/2014/main" id="{24CD6C11-B641-44A0-988A-9871DD444450}"/>
+              </a:ext>
+            </a:extLst>
+          </p:cNvPr>
+          <p:cNvSpPr txBox="1"/>
+          <p:nvPr/>
+        </p:nvSpPr>
+        <p:spPr>
+          <a:xfrm>
+            <a:off x="1684125" y="1112041"/>
+            <a:ext cx="2716635" cy="215444"/>
+          </a:xfrm>
+          <a:prstGeom prst="rect">
+            <a:avLst/>
+          </a:prstGeom>
+          <a:noFill/>
+        </p:spPr>
+        <p:txBody>
+          <a:bodyPr wrap="square" lIns="0" tIns="0" rIns="0" bIns="0" rtlCol="0">
+            <a:spAutoFit/>
+          </a:bodyPr>
+          <a:lstStyle/>
+          <a:p>
+            <a:r>
+              <a:rPr lang="en-US" sz="1400" dirty="0">
+                <a:solidFill>
+                  <a:schemeClr val="accent5">
+                    <a:lumMod val="75000"/>
+                  </a:schemeClr>
+                </a:solidFill>
+              </a:rPr>
+              <a:t>post(</a:t>
+            </a:r>
+            <a:r>
+              <a:rPr lang="en-US" sz="1400" dirty="0" err="1">
+                <a:solidFill>
+                  <a:schemeClr val="accent5">
+                    <a:lumMod val="75000"/>
+                  </a:schemeClr>
+                </a:solidFill>
+              </a:rPr>
+              <a:t>TemplateLoadRequestedEvent</a:t>
+            </a:r>
+            <a:r>
+              <a:rPr lang="en-US" sz="1400" dirty="0">
+                <a:solidFill>
+                  <a:schemeClr val="accent5">
+                    <a:lumMod val="75000"/>
+                  </a:schemeClr>
+                </a:solidFill>
+              </a:rPr>
+              <a:t>)</a:t>
+            </a:r>
+          </a:p>
+        </p:txBody>
+      </p:sp>
+      <p:cxnSp>
+        <p:nvCxnSpPr>
+          <p:cNvPr id="6" name="Straight Arrow Connector 5">
+            <a:extLst>
+              <a:ext uri="{FF2B5EF4-FFF2-40B4-BE49-F238E27FC236}">
+                <a16:creationId xmlns:a16="http://schemas.microsoft.com/office/drawing/2014/main" id="{23D4F1AB-B0F3-47D8-8F54-B3B2D3047638}"/>
+              </a:ext>
+            </a:extLst>
+          </p:cNvPr>
+          <p:cNvCxnSpPr/>
+          <p:nvPr/>
+        </p:nvCxnSpPr>
+        <p:spPr>
+          <a:xfrm flipH="1">
+            <a:off x="4542214" y="3729940"/>
+            <a:ext cx="3383941" cy="0"/>
+          </a:xfrm>
+          <a:prstGeom prst="straightConnector1">
+            <a:avLst/>
+          </a:prstGeom>
+          <a:ln w="19050">
+            <a:solidFill>
+              <a:schemeClr val="accent6">
+                <a:lumMod val="75000"/>
+              </a:schemeClr>
+            </a:solidFill>
+            <a:prstDash val="sysDash"/>
+            <a:headEnd type="none" w="med" len="med"/>
+            <a:tailEnd type="arrow" w="med" len="med"/>
+          </a:ln>
+        </p:spPr>
+        <p:style>
+          <a:lnRef idx="1">
+            <a:schemeClr val="accent1"/>
+          </a:lnRef>
+          <a:fillRef idx="0">
+            <a:schemeClr val="accent1"/>
+          </a:fillRef>
+          <a:effectRef idx="0">
+            <a:schemeClr val="accent1"/>
+          </a:effectRef>
+          <a:fontRef idx="minor">
+            <a:schemeClr val="tx1"/>
+          </a:fontRef>
+        </p:style>
+      </p:cxnSp>
+      <p:sp>
+        <p:nvSpPr>
+          <p:cNvPr id="7" name="Rectangle 62">
+            <a:extLst>
+              <a:ext uri="{FF2B5EF4-FFF2-40B4-BE49-F238E27FC236}">
+                <a16:creationId xmlns:a16="http://schemas.microsoft.com/office/drawing/2014/main" id="{8169BFD4-5372-40BA-8D38-7E61EFA7F7A9}"/>
+              </a:ext>
+            </a:extLst>
+          </p:cNvPr>
+          <p:cNvSpPr/>
+          <p:nvPr/>
+        </p:nvSpPr>
+        <p:spPr>
+          <a:xfrm>
+            <a:off x="3798871" y="609600"/>
+            <a:ext cx="1371600" cy="346760"/>
+          </a:xfrm>
+          <a:prstGeom prst="rect">
+            <a:avLst/>
+          </a:prstGeom>
+          <a:solidFill>
+            <a:schemeClr val="accent5">
+              <a:lumMod val="75000"/>
+            </a:schemeClr>
+          </a:solidFill>
+          <a:ln w="19050">
+            <a:solidFill>
+              <a:schemeClr val="accent5">
+                <a:lumMod val="75000"/>
+              </a:schemeClr>
+            </a:solidFill>
+          </a:ln>
+          <a:effectLst/>
+        </p:spPr>
+        <p:style>
+          <a:lnRef idx="1">
+            <a:schemeClr val="accent2"/>
+          </a:lnRef>
+          <a:fillRef idx="2">
+            <a:schemeClr val="accent2"/>
+          </a:fillRef>
+          <a:effectRef idx="1">
+            <a:schemeClr val="accent2"/>
+          </a:effectRef>
+          <a:fontRef idx="minor">
+            <a:schemeClr val="dk1"/>
+          </a:fontRef>
+        </p:style>
+        <p:txBody>
+          <a:bodyPr rtlCol="0" anchor="ctr"/>
+          <a:lstStyle/>
+          <a:p>
+            <a:pPr algn="ctr"/>
+            <a:r>
+              <a:rPr lang="en-US" sz="1600" dirty="0">
+                <a:solidFill>
+                  <a:schemeClr val="bg1"/>
+                </a:solidFill>
+              </a:rPr>
+              <a:t>:</a:t>
+            </a:r>
+            <a:r>
+              <a:rPr lang="en-US" sz="1600" dirty="0" err="1">
+                <a:solidFill>
+                  <a:schemeClr val="bg1"/>
+                </a:solidFill>
+              </a:rPr>
+              <a:t>EventsCenter</a:t>
+            </a:r>
+            <a:endParaRPr lang="en-SG" sz="1600" dirty="0">
+              <a:solidFill>
+                <a:schemeClr val="bg1"/>
+              </a:solidFill>
+            </a:endParaRPr>
+          </a:p>
+        </p:txBody>
+      </p:sp>
+      <p:cxnSp>
+        <p:nvCxnSpPr>
+          <p:cNvPr id="8" name="Straight Connector 7">
+            <a:extLst>
+              <a:ext uri="{FF2B5EF4-FFF2-40B4-BE49-F238E27FC236}">
+                <a16:creationId xmlns:a16="http://schemas.microsoft.com/office/drawing/2014/main" id="{5B2D370A-2D08-4506-8C3D-DCA33C88E569}"/>
+              </a:ext>
+            </a:extLst>
+          </p:cNvPr>
+          <p:cNvCxnSpPr>
+            <a:cxnSpLocks/>
+          </p:cNvCxnSpPr>
+          <p:nvPr/>
+        </p:nvCxnSpPr>
+        <p:spPr>
+          <a:xfrm>
+            <a:off x="4464456" y="962654"/>
+            <a:ext cx="0" cy="3533146"/>
+          </a:xfrm>
+          <a:prstGeom prst="line">
+            <a:avLst/>
+          </a:prstGeom>
+          <a:ln w="19050">
+            <a:solidFill>
+              <a:schemeClr val="accent5">
+                <a:lumMod val="75000"/>
+              </a:schemeClr>
+            </a:solidFill>
+            <a:prstDash val="sysDash"/>
+          </a:ln>
+          <a:effectLst/>
+        </p:spPr>
+        <p:style>
+          <a:lnRef idx="1">
+            <a:schemeClr val="accent1"/>
+          </a:lnRef>
+          <a:fillRef idx="2">
+            <a:schemeClr val="accent1"/>
+          </a:fillRef>
+          <a:effectRef idx="1">
+            <a:schemeClr val="accent1"/>
+          </a:effectRef>
+          <a:fontRef idx="minor">
+            <a:schemeClr val="dk1"/>
+          </a:fontRef>
+        </p:style>
+      </p:cxnSp>
+      <p:sp>
+        <p:nvSpPr>
+          <p:cNvPr id="9" name="Rectangle 8">
+            <a:extLst>
+              <a:ext uri="{FF2B5EF4-FFF2-40B4-BE49-F238E27FC236}">
+                <a16:creationId xmlns:a16="http://schemas.microsoft.com/office/drawing/2014/main" id="{F26DCCB7-3CD3-4046-972C-748CB59061CF}"/>
+              </a:ext>
+            </a:extLst>
+          </p:cNvPr>
+          <p:cNvSpPr/>
+          <p:nvPr/>
+        </p:nvSpPr>
+        <p:spPr>
+          <a:xfrm>
+            <a:off x="4392448" y="1385587"/>
+            <a:ext cx="142006" cy="1436984"/>
+          </a:xfrm>
+          <a:prstGeom prst="rect">
+            <a:avLst/>
+          </a:prstGeom>
+          <a:solidFill>
+            <a:schemeClr val="accent5">
+              <a:lumMod val="75000"/>
+            </a:schemeClr>
+          </a:solidFill>
+          <a:ln>
+            <a:solidFill>
+              <a:schemeClr val="accent5">
+                <a:lumMod val="75000"/>
+              </a:schemeClr>
+            </a:solidFill>
+          </a:ln>
+          <a:effectLst/>
+        </p:spPr>
+        <p:style>
+          <a:lnRef idx="1">
+            <a:schemeClr val="accent3"/>
+          </a:lnRef>
+          <a:fillRef idx="2">
+            <a:schemeClr val="accent3"/>
+          </a:fillRef>
+          <a:effectRef idx="1">
+            <a:schemeClr val="accent3"/>
+          </a:effectRef>
+          <a:fontRef idx="minor">
+            <a:schemeClr val="dk1"/>
+          </a:fontRef>
+        </p:style>
+        <p:txBody>
+          <a:bodyPr rtlCol="0" anchor="ctr"/>
+          <a:lstStyle/>
+          <a:p>
+            <a:pPr algn="ctr"/>
+            <a:endParaRPr lang="en-SG" sz="1400">
+              <a:solidFill>
+                <a:schemeClr val="dk1"/>
+              </a:solidFill>
+            </a:endParaRPr>
+          </a:p>
+        </p:txBody>
+      </p:sp>
+      <p:cxnSp>
+        <p:nvCxnSpPr>
+          <p:cNvPr id="10" name="Straight Arrow Connector 9">
+            <a:extLst>
+              <a:ext uri="{FF2B5EF4-FFF2-40B4-BE49-F238E27FC236}">
+                <a16:creationId xmlns:a16="http://schemas.microsoft.com/office/drawing/2014/main" id="{B378C8EB-E5C3-45A8-B1CA-E86D5F120A30}"/>
+              </a:ext>
+            </a:extLst>
+          </p:cNvPr>
+          <p:cNvCxnSpPr>
+            <a:cxnSpLocks/>
+            <a:stCxn id="30" idx="0"/>
+          </p:cNvCxnSpPr>
+          <p:nvPr/>
+        </p:nvCxnSpPr>
+        <p:spPr>
+          <a:xfrm>
+            <a:off x="1270893" y="1380276"/>
+            <a:ext cx="3111161" cy="5311"/>
+          </a:xfrm>
+          <a:prstGeom prst="straightConnector1">
+            <a:avLst/>
+          </a:prstGeom>
+          <a:ln w="19050">
+            <a:solidFill>
+              <a:srgbClr val="7030A0"/>
+            </a:solidFill>
+            <a:tailEnd type="arrow"/>
+          </a:ln>
+        </p:spPr>
+        <p:style>
+          <a:lnRef idx="1">
+            <a:schemeClr val="accent1"/>
+          </a:lnRef>
+          <a:fillRef idx="0">
+            <a:schemeClr val="accent1"/>
+          </a:fillRef>
+          <a:effectRef idx="0">
+            <a:schemeClr val="accent1"/>
+          </a:effectRef>
+          <a:fontRef idx="minor">
+            <a:schemeClr val="tx1"/>
+          </a:fontRef>
+        </p:style>
+      </p:cxnSp>
+      <p:cxnSp>
+        <p:nvCxnSpPr>
+          <p:cNvPr id="11" name="Straight Arrow Connector 10">
+            <a:extLst>
+              <a:ext uri="{FF2B5EF4-FFF2-40B4-BE49-F238E27FC236}">
+                <a16:creationId xmlns:a16="http://schemas.microsoft.com/office/drawing/2014/main" id="{F04876CE-7855-4ABF-A4BF-E40BA877BC4C}"/>
+              </a:ext>
+            </a:extLst>
+          </p:cNvPr>
+          <p:cNvCxnSpPr>
+            <a:cxnSpLocks/>
+          </p:cNvCxnSpPr>
+          <p:nvPr/>
+        </p:nvCxnSpPr>
+        <p:spPr>
+          <a:xfrm>
+            <a:off x="1349139" y="2815540"/>
+            <a:ext cx="3051069" cy="0"/>
+          </a:xfrm>
+          <a:prstGeom prst="straightConnector1">
+            <a:avLst/>
+          </a:prstGeom>
+          <a:ln w="19050">
+            <a:solidFill>
+              <a:schemeClr val="accent5">
+                <a:lumMod val="75000"/>
+              </a:schemeClr>
+            </a:solidFill>
+            <a:prstDash val="sysDash"/>
+            <a:headEnd type="arrow" w="med" len="med"/>
+            <a:tailEnd type="none" w="med" len="med"/>
+          </a:ln>
+        </p:spPr>
+        <p:style>
+          <a:lnRef idx="1">
+            <a:schemeClr val="accent1"/>
+          </a:lnRef>
+          <a:fillRef idx="0">
+            <a:schemeClr val="accent1"/>
+          </a:fillRef>
+          <a:effectRef idx="0">
+            <a:schemeClr val="accent1"/>
+          </a:effectRef>
+          <a:fontRef idx="minor">
+            <a:schemeClr val="tx1"/>
+          </a:fontRef>
+        </p:style>
+      </p:cxnSp>
+      <p:cxnSp>
+        <p:nvCxnSpPr>
+          <p:cNvPr id="12" name="Straight Arrow Connector 11">
+            <a:extLst>
+              <a:ext uri="{FF2B5EF4-FFF2-40B4-BE49-F238E27FC236}">
+                <a16:creationId xmlns:a16="http://schemas.microsoft.com/office/drawing/2014/main" id="{7DDDD477-67AE-437A-9435-511CB5965337}"/>
+              </a:ext>
+            </a:extLst>
+          </p:cNvPr>
+          <p:cNvCxnSpPr/>
+          <p:nvPr/>
+        </p:nvCxnSpPr>
+        <p:spPr>
+          <a:xfrm>
+            <a:off x="4534454" y="1655381"/>
+            <a:ext cx="3318258" cy="0"/>
+          </a:xfrm>
+          <a:prstGeom prst="straightConnector1">
+            <a:avLst/>
+          </a:prstGeom>
+          <a:ln w="19050">
+            <a:solidFill>
+              <a:schemeClr val="accent5">
+                <a:lumMod val="75000"/>
+              </a:schemeClr>
+            </a:solidFill>
+            <a:headEnd type="none" w="med" len="med"/>
+            <a:tailEnd type="arrow" w="med" len="med"/>
+          </a:ln>
+        </p:spPr>
+        <p:style>
+          <a:lnRef idx="1">
+            <a:schemeClr val="accent1"/>
+          </a:lnRef>
+          <a:fillRef idx="0">
+            <a:schemeClr val="accent1"/>
+          </a:fillRef>
+          <a:effectRef idx="0">
+            <a:schemeClr val="accent1"/>
+          </a:effectRef>
+          <a:fontRef idx="minor">
+            <a:schemeClr val="tx1"/>
+          </a:fontRef>
+        </p:style>
+      </p:cxnSp>
+      <p:sp>
+        <p:nvSpPr>
+          <p:cNvPr id="13" name="TextBox 12">
+            <a:extLst>
+              <a:ext uri="{FF2B5EF4-FFF2-40B4-BE49-F238E27FC236}">
+                <a16:creationId xmlns:a16="http://schemas.microsoft.com/office/drawing/2014/main" id="{803F2FBD-3C84-410E-B347-FA33790014C1}"/>
+              </a:ext>
+            </a:extLst>
+          </p:cNvPr>
+          <p:cNvSpPr txBox="1"/>
+          <p:nvPr/>
+        </p:nvSpPr>
+        <p:spPr>
+          <a:xfrm>
+            <a:off x="4841411" y="1380278"/>
+            <a:ext cx="2862514" cy="215444"/>
+          </a:xfrm>
+          <a:prstGeom prst="rect">
+            <a:avLst/>
+          </a:prstGeom>
+          <a:noFill/>
+        </p:spPr>
+        <p:txBody>
+          <a:bodyPr wrap="square" lIns="0" tIns="0" rIns="0" bIns="0" rtlCol="0">
+            <a:spAutoFit/>
+          </a:bodyPr>
+          <a:lstStyle/>
+          <a:p>
+            <a:r>
+              <a:rPr lang="en-US" sz="1400" dirty="0" err="1">
+                <a:solidFill>
+                  <a:schemeClr val="accent6">
+                    <a:lumMod val="75000"/>
+                  </a:schemeClr>
+                </a:solidFill>
+              </a:rPr>
+              <a:t>handleTemplateLoadRequestedEvent</a:t>
+            </a:r>
+            <a:r>
+              <a:rPr lang="en-US" sz="1400" dirty="0">
+                <a:solidFill>
+                  <a:schemeClr val="accent6">
+                    <a:lumMod val="75000"/>
+                  </a:schemeClr>
+                </a:solidFill>
+              </a:rPr>
+              <a:t>()</a:t>
+            </a:r>
+          </a:p>
+        </p:txBody>
+      </p:sp>
+      <p:sp>
+        <p:nvSpPr>
+          <p:cNvPr id="14" name="Rectangle 62">
+            <a:extLst>
+              <a:ext uri="{FF2B5EF4-FFF2-40B4-BE49-F238E27FC236}">
+                <a16:creationId xmlns:a16="http://schemas.microsoft.com/office/drawing/2014/main" id="{01A1F991-7DB9-4CBB-8856-0D27820CD080}"/>
+              </a:ext>
+            </a:extLst>
+          </p:cNvPr>
+          <p:cNvSpPr/>
+          <p:nvPr/>
+        </p:nvSpPr>
+        <p:spPr>
+          <a:xfrm>
+            <a:off x="729359" y="592689"/>
+            <a:ext cx="1093635" cy="346760"/>
+          </a:xfrm>
+          <a:prstGeom prst="rect">
+            <a:avLst/>
+          </a:prstGeom>
+          <a:solidFill>
+            <a:srgbClr val="7030A0"/>
+          </a:solidFill>
+          <a:ln w="19050">
+            <a:solidFill>
+              <a:srgbClr val="7030A0"/>
+            </a:solidFill>
+          </a:ln>
+          <a:effectLst/>
+        </p:spPr>
+        <p:style>
+          <a:lnRef idx="1">
+            <a:schemeClr val="accent2"/>
+          </a:lnRef>
+          <a:fillRef idx="2">
+            <a:schemeClr val="accent2"/>
+          </a:fillRef>
+          <a:effectRef idx="1">
+            <a:schemeClr val="accent2"/>
+          </a:effectRef>
+          <a:fontRef idx="minor">
+            <a:schemeClr val="dk1"/>
+          </a:fontRef>
+        </p:style>
+        <p:txBody>
+          <a:bodyPr rtlCol="0" anchor="ctr"/>
+          <a:lstStyle/>
+          <a:p>
+            <a:pPr algn="ctr"/>
+            <a:r>
+              <a:rPr lang="en-US" sz="1600" dirty="0">
+                <a:solidFill>
+                  <a:schemeClr val="bg1"/>
+                </a:solidFill>
+              </a:rPr>
+              <a:t>:Model</a:t>
+            </a:r>
+            <a:endParaRPr lang="en-SG" sz="1600" dirty="0">
+              <a:solidFill>
+                <a:schemeClr val="bg1"/>
+              </a:solidFill>
+            </a:endParaRPr>
+          </a:p>
+        </p:txBody>
+      </p:sp>
+      <p:cxnSp>
+        <p:nvCxnSpPr>
+          <p:cNvPr id="15" name="Straight Connector 14">
+            <a:extLst>
+              <a:ext uri="{FF2B5EF4-FFF2-40B4-BE49-F238E27FC236}">
+                <a16:creationId xmlns:a16="http://schemas.microsoft.com/office/drawing/2014/main" id="{CE22512C-19FC-4ADC-AACC-DCFFC82FB843}"/>
+              </a:ext>
+            </a:extLst>
+          </p:cNvPr>
+          <p:cNvCxnSpPr>
+            <a:cxnSpLocks/>
+          </p:cNvCxnSpPr>
+          <p:nvPr/>
+        </p:nvCxnSpPr>
+        <p:spPr>
+          <a:xfrm>
+            <a:off x="1276176" y="956360"/>
+            <a:ext cx="0" cy="3539440"/>
+          </a:xfrm>
+          <a:prstGeom prst="line">
+            <a:avLst/>
+          </a:prstGeom>
+          <a:ln w="19050">
+            <a:solidFill>
+              <a:srgbClr val="7030A0"/>
+            </a:solidFill>
+            <a:prstDash val="sysDash"/>
+          </a:ln>
+          <a:effectLst/>
+        </p:spPr>
+        <p:style>
+          <a:lnRef idx="1">
+            <a:schemeClr val="accent1"/>
+          </a:lnRef>
+          <a:fillRef idx="2">
+            <a:schemeClr val="accent1"/>
+          </a:fillRef>
+          <a:effectRef idx="1">
+            <a:schemeClr val="accent1"/>
+          </a:effectRef>
+          <a:fontRef idx="minor">
+            <a:schemeClr val="dk1"/>
+          </a:fontRef>
+        </p:style>
+      </p:cxnSp>
+      <p:cxnSp>
+        <p:nvCxnSpPr>
+          <p:cNvPr id="18" name="Straight Arrow Connector 17">
+            <a:extLst>
+              <a:ext uri="{FF2B5EF4-FFF2-40B4-BE49-F238E27FC236}">
+                <a16:creationId xmlns:a16="http://schemas.microsoft.com/office/drawing/2014/main" id="{69ABB5E9-E2DF-4F8B-9A18-912A97695448}"/>
+              </a:ext>
+            </a:extLst>
+          </p:cNvPr>
+          <p:cNvCxnSpPr/>
+          <p:nvPr/>
+        </p:nvCxnSpPr>
+        <p:spPr>
+          <a:xfrm>
+            <a:off x="1341625" y="2501876"/>
+            <a:ext cx="3061841" cy="0"/>
+          </a:xfrm>
+          <a:prstGeom prst="straightConnector1">
+            <a:avLst/>
+          </a:prstGeom>
+          <a:ln w="19050">
+            <a:solidFill>
+              <a:schemeClr val="accent5">
+                <a:lumMod val="75000"/>
+              </a:schemeClr>
+            </a:solidFill>
+            <a:headEnd type="arrow" w="med" len="med"/>
+            <a:tailEnd type="none" w="med" len="med"/>
+          </a:ln>
+        </p:spPr>
+        <p:style>
+          <a:lnRef idx="1">
+            <a:schemeClr val="accent1"/>
+          </a:lnRef>
+          <a:fillRef idx="0">
+            <a:schemeClr val="accent1"/>
+          </a:fillRef>
+          <a:effectRef idx="0">
+            <a:schemeClr val="accent1"/>
+          </a:effectRef>
+          <a:fontRef idx="minor">
+            <a:schemeClr val="tx1"/>
+          </a:fontRef>
+        </p:style>
+      </p:cxnSp>
+      <p:sp>
+        <p:nvSpPr>
+          <p:cNvPr id="19" name="TextBox 18">
+            <a:extLst>
+              <a:ext uri="{FF2B5EF4-FFF2-40B4-BE49-F238E27FC236}">
+                <a16:creationId xmlns:a16="http://schemas.microsoft.com/office/drawing/2014/main" id="{42267524-6873-43F3-AB5A-6768B5860BF8}"/>
+              </a:ext>
+            </a:extLst>
+          </p:cNvPr>
+          <p:cNvSpPr txBox="1"/>
+          <p:nvPr/>
+        </p:nvSpPr>
+        <p:spPr>
+          <a:xfrm>
+            <a:off x="1454268" y="2235242"/>
+            <a:ext cx="2659870" cy="215444"/>
+          </a:xfrm>
+          <a:prstGeom prst="rect">
+            <a:avLst/>
+          </a:prstGeom>
+          <a:noFill/>
+        </p:spPr>
+        <p:txBody>
+          <a:bodyPr wrap="square" lIns="0" tIns="0" rIns="0" bIns="0" rtlCol="0">
+            <a:spAutoFit/>
+          </a:bodyPr>
+          <a:lstStyle/>
+          <a:p>
+            <a:r>
+              <a:rPr lang="en-US" sz="1400" dirty="0" err="1">
+                <a:solidFill>
+                  <a:srgbClr val="7030A0"/>
+                </a:solidFill>
+              </a:rPr>
+              <a:t>handleTemplateLoadedEvent</a:t>
+            </a:r>
+            <a:r>
+              <a:rPr lang="en-US" sz="1400" dirty="0">
+                <a:solidFill>
+                  <a:srgbClr val="7030A0"/>
+                </a:solidFill>
+              </a:rPr>
+              <a:t>()</a:t>
+            </a:r>
+          </a:p>
+        </p:txBody>
+      </p:sp>
+      <p:grpSp>
+        <p:nvGrpSpPr>
+          <p:cNvPr id="24" name="Group 23">
+            <a:extLst>
+              <a:ext uri="{FF2B5EF4-FFF2-40B4-BE49-F238E27FC236}">
+                <a16:creationId xmlns:a16="http://schemas.microsoft.com/office/drawing/2014/main" id="{977CFC58-A110-4B5E-81B6-57C2139B0469}"/>
+              </a:ext>
+            </a:extLst>
+          </p:cNvPr>
+          <p:cNvGrpSpPr/>
+          <p:nvPr/>
+        </p:nvGrpSpPr>
+        <p:grpSpPr>
+          <a:xfrm flipH="1">
+            <a:off x="7944567" y="1650029"/>
+            <a:ext cx="217349" cy="270072"/>
+            <a:chOff x="1028134" y="5612032"/>
+            <a:chExt cx="217349" cy="270072"/>
+          </a:xfrm>
+        </p:grpSpPr>
+        <p:sp>
+          <p:nvSpPr>
+            <p:cNvPr id="25" name="Freeform 58">
+              <a:extLst>
+                <a:ext uri="{FF2B5EF4-FFF2-40B4-BE49-F238E27FC236}">
+                  <a16:creationId xmlns:a16="http://schemas.microsoft.com/office/drawing/2014/main" id="{CF5176F6-EAE6-4B1C-9715-5AD78A19465B}"/>
+                </a:ext>
+              </a:extLst>
+            </p:cNvPr>
+            <p:cNvSpPr/>
+            <p:nvPr/>
+          </p:nvSpPr>
+          <p:spPr>
+            <a:xfrm rot="2600998" flipH="1" flipV="1">
+              <a:off x="1028134" y="5612032"/>
+              <a:ext cx="167452" cy="116880"/>
+            </a:xfrm>
+            <a:custGeom>
+              <a:avLst/>
+              <a:gdLst>
+                <a:gd name="connsiteX0" fmla="*/ 0 w 226400"/>
+                <a:gd name="connsiteY0" fmla="*/ 32920 h 171466"/>
+                <a:gd name="connsiteX1" fmla="*/ 157018 w 226400"/>
+                <a:gd name="connsiteY1" fmla="*/ 5211 h 171466"/>
+                <a:gd name="connsiteX2" fmla="*/ 221673 w 226400"/>
+                <a:gd name="connsiteY2" fmla="*/ 125284 h 171466"/>
+                <a:gd name="connsiteX3" fmla="*/ 36945 w 226400"/>
+                <a:gd name="connsiteY3" fmla="*/ 171466 h 171466"/>
+              </a:gdLst>
+              <a:ahLst/>
+              <a:cxnLst>
+                <a:cxn ang="0">
+                  <a:pos x="connsiteX0" y="connsiteY0"/>
+                </a:cxn>
+                <a:cxn ang="0">
+                  <a:pos x="connsiteX1" y="connsiteY1"/>
+                </a:cxn>
+                <a:cxn ang="0">
+                  <a:pos x="connsiteX2" y="connsiteY2"/>
+                </a:cxn>
+                <a:cxn ang="0">
+                  <a:pos x="connsiteX3" y="connsiteY3"/>
+                </a:cxn>
+              </a:cxnLst>
+              <a:rect l="l" t="t" r="r" b="b"/>
+              <a:pathLst>
+                <a:path w="226400" h="171466">
+                  <a:moveTo>
+                    <a:pt x="0" y="32920"/>
+                  </a:moveTo>
+                  <a:cubicBezTo>
+                    <a:pt x="60036" y="11368"/>
+                    <a:pt x="120073" y="-10183"/>
+                    <a:pt x="157018" y="5211"/>
+                  </a:cubicBezTo>
+                  <a:cubicBezTo>
+                    <a:pt x="193963" y="20605"/>
+                    <a:pt x="241685" y="97575"/>
+                    <a:pt x="221673" y="125284"/>
+                  </a:cubicBezTo>
+                  <a:cubicBezTo>
+                    <a:pt x="201661" y="152993"/>
+                    <a:pt x="119303" y="162229"/>
+                    <a:pt x="36945" y="171466"/>
+                  </a:cubicBezTo>
+                </a:path>
+              </a:pathLst>
+            </a:custGeom>
+            <a:ln w="19050">
               <a:solidFill>
                 <a:schemeClr val="accent6">
                   <a:lumMod val="75000"/>
                 </a:schemeClr>
               </a:solidFill>
+              <a:headEnd type="arrow" w="med" len="med"/>
+              <a:tailEnd type="none" w="med" len="med"/>
+            </a:ln>
+          </p:spPr>
+          <p:style>
+            <a:lnRef idx="1">
+              <a:schemeClr val="accent1"/>
+            </a:lnRef>
+            <a:fillRef idx="0">
+              <a:schemeClr val="accent1"/>
+            </a:fillRef>
+            <a:effectRef idx="0">
+              <a:schemeClr val="accent1"/>
+            </a:effectRef>
+            <a:fontRef idx="minor">
+              <a:schemeClr val="tx1"/>
+            </a:fontRef>
+          </p:style>
+          <p:txBody>
+            <a:bodyPr rtlCol="0" anchor="ctr"/>
+            <a:lstStyle/>
+            <a:p>
+              <a:pPr algn="ctr"/>
+              <a:endParaRPr lang="en-SG"/>
+            </a:p>
+          </p:txBody>
+        </p:sp>
+        <p:sp>
+          <p:nvSpPr>
+            <p:cNvPr id="26" name="Rectangle 25">
+              <a:extLst>
+                <a:ext uri="{FF2B5EF4-FFF2-40B4-BE49-F238E27FC236}">
+                  <a16:creationId xmlns:a16="http://schemas.microsoft.com/office/drawing/2014/main" id="{436DA74F-3DD0-441C-B162-F425ECEDBAD5}"/>
+                </a:ext>
+              </a:extLst>
+            </p:cNvPr>
+            <p:cNvSpPr/>
+            <p:nvPr/>
+          </p:nvSpPr>
+          <p:spPr>
+            <a:xfrm>
+              <a:off x="1147403" y="5712513"/>
+              <a:ext cx="98080" cy="169591"/>
+            </a:xfrm>
+            <a:prstGeom prst="rect">
+              <a:avLst/>
+            </a:prstGeom>
+            <a:solidFill>
+              <a:schemeClr val="accent6">
+                <a:lumMod val="75000"/>
+              </a:schemeClr>
+            </a:solidFill>
+            <a:ln>
+              <a:solidFill>
+                <a:schemeClr val="bg1"/>
+              </a:solidFill>
+            </a:ln>
+            <a:effectLst/>
+          </p:spPr>
+          <p:style>
+            <a:lnRef idx="1">
+              <a:schemeClr val="accent3"/>
+            </a:lnRef>
+            <a:fillRef idx="2">
+              <a:schemeClr val="accent3"/>
+            </a:fillRef>
+            <a:effectRef idx="1">
+              <a:schemeClr val="accent3"/>
+            </a:effectRef>
+            <a:fontRef idx="minor">
+              <a:schemeClr val="dk1"/>
+            </a:fontRef>
+          </p:style>
+          <p:txBody>
+            <a:bodyPr rtlCol="0" anchor="ctr"/>
+            <a:lstStyle/>
+            <a:p>
+              <a:pPr algn="ctr"/>
+              <a:endParaRPr lang="en-SG" sz="1400">
+                <a:solidFill>
+                  <a:schemeClr val="dk1"/>
+                </a:solidFill>
+              </a:endParaRPr>
+            </a:p>
+          </p:txBody>
+        </p:sp>
+      </p:grpSp>
+      <p:sp>
+        <p:nvSpPr>
+          <p:cNvPr id="27" name="TextBox 26">
+            <a:extLst>
+              <a:ext uri="{FF2B5EF4-FFF2-40B4-BE49-F238E27FC236}">
+                <a16:creationId xmlns:a16="http://schemas.microsoft.com/office/drawing/2014/main" id="{84549DEE-C91F-4D88-9DEE-74801F8395D4}"/>
+              </a:ext>
+            </a:extLst>
+          </p:cNvPr>
+          <p:cNvSpPr txBox="1"/>
+          <p:nvPr/>
+        </p:nvSpPr>
+        <p:spPr>
+          <a:xfrm>
+            <a:off x="8022391" y="1370244"/>
+            <a:ext cx="1093617" cy="215444"/>
+          </a:xfrm>
+          <a:prstGeom prst="rect">
+            <a:avLst/>
+          </a:prstGeom>
+          <a:noFill/>
+        </p:spPr>
+        <p:txBody>
+          <a:bodyPr wrap="square" lIns="0" tIns="0" rIns="0" bIns="0" rtlCol="0">
+            <a:spAutoFit/>
+          </a:bodyPr>
+          <a:lstStyle/>
+          <a:p>
+            <a:r>
+              <a:rPr lang="en-US" sz="1400" dirty="0" err="1">
+                <a:solidFill>
+                  <a:schemeClr val="accent6">
+                    <a:lumMod val="75000"/>
+                  </a:schemeClr>
+                </a:solidFill>
+              </a:rPr>
+              <a:t>loadTemplate</a:t>
+            </a:r>
+            <a:r>
+              <a:rPr lang="en-US" sz="1400" dirty="0">
+                <a:solidFill>
+                  <a:schemeClr val="accent6">
+                    <a:lumMod val="75000"/>
+                  </a:schemeClr>
+                </a:solidFill>
+              </a:rPr>
+              <a:t>()</a:t>
+            </a:r>
+          </a:p>
+        </p:txBody>
+      </p:sp>
+      <p:cxnSp>
+        <p:nvCxnSpPr>
+          <p:cNvPr id="28" name="Straight Arrow Connector 27">
+            <a:extLst>
+              <a:ext uri="{FF2B5EF4-FFF2-40B4-BE49-F238E27FC236}">
+                <a16:creationId xmlns:a16="http://schemas.microsoft.com/office/drawing/2014/main" id="{55C2145D-ADEE-4414-BA57-3B117A15F95C}"/>
+              </a:ext>
+            </a:extLst>
+          </p:cNvPr>
+          <p:cNvCxnSpPr/>
+          <p:nvPr/>
+        </p:nvCxnSpPr>
+        <p:spPr>
+          <a:xfrm flipH="1">
+            <a:off x="4534454" y="2319530"/>
+            <a:ext cx="3383941" cy="0"/>
+          </a:xfrm>
+          <a:prstGeom prst="straightConnector1">
+            <a:avLst/>
+          </a:prstGeom>
+          <a:ln w="19050">
+            <a:solidFill>
+              <a:schemeClr val="accent6">
+                <a:lumMod val="75000"/>
+              </a:schemeClr>
+            </a:solidFill>
+            <a:prstDash val="solid"/>
+            <a:headEnd type="none" w="med" len="med"/>
+            <a:tailEnd type="arrow" w="med" len="med"/>
+          </a:ln>
+        </p:spPr>
+        <p:style>
+          <a:lnRef idx="1">
+            <a:schemeClr val="accent1"/>
+          </a:lnRef>
+          <a:fillRef idx="0">
+            <a:schemeClr val="accent1"/>
+          </a:fillRef>
+          <a:effectRef idx="0">
+            <a:schemeClr val="accent1"/>
+          </a:effectRef>
+          <a:fontRef idx="minor">
+            <a:schemeClr val="tx1"/>
+          </a:fontRef>
+        </p:style>
+      </p:cxnSp>
+      <p:sp>
+        <p:nvSpPr>
+          <p:cNvPr id="29" name="TextBox 28">
+            <a:extLst>
+              <a:ext uri="{FF2B5EF4-FFF2-40B4-BE49-F238E27FC236}">
+                <a16:creationId xmlns:a16="http://schemas.microsoft.com/office/drawing/2014/main" id="{4309C09C-A48D-4F82-958F-9F4F68D1BA06}"/>
+              </a:ext>
+            </a:extLst>
+          </p:cNvPr>
+          <p:cNvSpPr txBox="1"/>
+          <p:nvPr/>
+        </p:nvSpPr>
+        <p:spPr>
+          <a:xfrm>
+            <a:off x="4802384" y="2300306"/>
+            <a:ext cx="2307381" cy="215444"/>
+          </a:xfrm>
+          <a:prstGeom prst="rect">
+            <a:avLst/>
+          </a:prstGeom>
+          <a:noFill/>
+        </p:spPr>
+        <p:txBody>
+          <a:bodyPr wrap="square" lIns="0" tIns="0" rIns="0" bIns="0" rtlCol="0">
+            <a:spAutoFit/>
+          </a:bodyPr>
+          <a:lstStyle/>
+          <a:p>
+            <a:r>
+              <a:rPr lang="en-US" sz="1400" dirty="0">
+                <a:solidFill>
+                  <a:schemeClr val="accent5">
+                    <a:lumMod val="75000"/>
+                  </a:schemeClr>
+                </a:solidFill>
+              </a:rPr>
+              <a:t>post(</a:t>
+            </a:r>
+            <a:r>
+              <a:rPr lang="en-US" sz="1400" dirty="0" err="1">
+                <a:solidFill>
+                  <a:schemeClr val="accent5">
+                    <a:lumMod val="75000"/>
+                  </a:schemeClr>
+                </a:solidFill>
+              </a:rPr>
+              <a:t>TemplateLoadedEvent</a:t>
+            </a:r>
+            <a:r>
+              <a:rPr lang="en-US" sz="1400" dirty="0">
+                <a:solidFill>
+                  <a:schemeClr val="accent5">
+                    <a:lumMod val="75000"/>
+                  </a:schemeClr>
+                </a:solidFill>
+              </a:rPr>
+              <a:t>)</a:t>
+            </a:r>
+          </a:p>
+        </p:txBody>
+      </p:sp>
+      <p:sp>
+        <p:nvSpPr>
+          <p:cNvPr id="30" name="Rectangle 29">
+            <a:extLst>
+              <a:ext uri="{FF2B5EF4-FFF2-40B4-BE49-F238E27FC236}">
+                <a16:creationId xmlns:a16="http://schemas.microsoft.com/office/drawing/2014/main" id="{0CA2562F-E759-4117-971E-11B8481F482C}"/>
+              </a:ext>
+            </a:extLst>
+          </p:cNvPr>
+          <p:cNvSpPr/>
+          <p:nvPr/>
+        </p:nvSpPr>
+        <p:spPr>
+          <a:xfrm>
+            <a:off x="1199890" y="1380276"/>
+            <a:ext cx="142006" cy="2886922"/>
+          </a:xfrm>
+          <a:prstGeom prst="rect">
+            <a:avLst/>
+          </a:prstGeom>
+          <a:solidFill>
+            <a:srgbClr val="7030A0"/>
+          </a:solidFill>
+          <a:ln>
+            <a:solidFill>
+              <a:srgbClr val="7030A0"/>
+            </a:solidFill>
+          </a:ln>
+          <a:effectLst/>
+        </p:spPr>
+        <p:style>
+          <a:lnRef idx="1">
+            <a:schemeClr val="accent3"/>
+          </a:lnRef>
+          <a:fillRef idx="2">
+            <a:schemeClr val="accent3"/>
+          </a:fillRef>
+          <a:effectRef idx="1">
+            <a:schemeClr val="accent3"/>
+          </a:effectRef>
+          <a:fontRef idx="minor">
+            <a:schemeClr val="dk1"/>
+          </a:fontRef>
+        </p:style>
+        <p:txBody>
+          <a:bodyPr rtlCol="0" anchor="ctr"/>
+          <a:lstStyle/>
+          <a:p>
+            <a:pPr algn="ctr"/>
+            <a:endParaRPr lang="en-SG" sz="1400">
+              <a:solidFill>
+                <a:schemeClr val="dk1"/>
+              </a:solidFill>
             </a:endParaRPr>
+          </a:p>
+        </p:txBody>
+      </p:sp>
+      <p:sp>
+        <p:nvSpPr>
+          <p:cNvPr id="32" name="Rectangle 31">
+            <a:extLst>
+              <a:ext uri="{FF2B5EF4-FFF2-40B4-BE49-F238E27FC236}">
+                <a16:creationId xmlns:a16="http://schemas.microsoft.com/office/drawing/2014/main" id="{18D2F271-F394-41B2-9F63-0C888762C4C9}"/>
+              </a:ext>
+            </a:extLst>
+          </p:cNvPr>
+          <p:cNvSpPr/>
+          <p:nvPr/>
+        </p:nvSpPr>
+        <p:spPr>
+          <a:xfrm>
+            <a:off x="729358" y="2004548"/>
+            <a:ext cx="7739281" cy="2102533"/>
+          </a:xfrm>
+          <a:prstGeom prst="rect">
+            <a:avLst/>
+          </a:prstGeom>
+          <a:noFill/>
+          <a:ln>
+            <a:solidFill>
+              <a:srgbClr val="FF0000"/>
+            </a:solidFill>
+          </a:ln>
+        </p:spPr>
+        <p:style>
+          <a:lnRef idx="2">
+            <a:schemeClr val="accent1">
+              <a:shade val="50000"/>
+            </a:schemeClr>
+          </a:lnRef>
+          <a:fillRef idx="1">
+            <a:schemeClr val="accent1"/>
+          </a:fillRef>
+          <a:effectRef idx="0">
+            <a:schemeClr val="accent1"/>
+          </a:effectRef>
+          <a:fontRef idx="minor">
+            <a:schemeClr val="lt1"/>
+          </a:fontRef>
+        </p:style>
+        <p:txBody>
+          <a:bodyPr rtlCol="0" anchor="ctr"/>
+          <a:lstStyle/>
+          <a:p>
+            <a:pPr algn="ctr"/>
+            <a:endParaRPr lang="en-SG"/>
+          </a:p>
+        </p:txBody>
+      </p:sp>
+      <p:cxnSp>
+        <p:nvCxnSpPr>
+          <p:cNvPr id="37" name="Straight Arrow Connector 36">
+            <a:extLst>
+              <a:ext uri="{FF2B5EF4-FFF2-40B4-BE49-F238E27FC236}">
+                <a16:creationId xmlns:a16="http://schemas.microsoft.com/office/drawing/2014/main" id="{E20EF967-E80E-43BB-B6AE-D08F18C029D5}"/>
+              </a:ext>
+            </a:extLst>
+          </p:cNvPr>
+          <p:cNvCxnSpPr/>
+          <p:nvPr/>
+        </p:nvCxnSpPr>
+        <p:spPr>
+          <a:xfrm>
+            <a:off x="1367340" y="3539615"/>
+            <a:ext cx="3061841" cy="0"/>
+          </a:xfrm>
+          <a:prstGeom prst="straightConnector1">
+            <a:avLst/>
+          </a:prstGeom>
+          <a:ln w="19050">
+            <a:solidFill>
+              <a:schemeClr val="accent5">
+                <a:lumMod val="75000"/>
+              </a:schemeClr>
+            </a:solidFill>
+            <a:headEnd type="arrow" w="med" len="med"/>
+            <a:tailEnd type="none" w="med" len="med"/>
+          </a:ln>
+        </p:spPr>
+        <p:style>
+          <a:lnRef idx="1">
+            <a:schemeClr val="accent1"/>
+          </a:lnRef>
+          <a:fillRef idx="0">
+            <a:schemeClr val="accent1"/>
+          </a:fillRef>
+          <a:effectRef idx="0">
+            <a:schemeClr val="accent1"/>
+          </a:effectRef>
+          <a:fontRef idx="minor">
+            <a:schemeClr val="tx1"/>
+          </a:fontRef>
+        </p:style>
+      </p:cxnSp>
+      <p:sp>
+        <p:nvSpPr>
+          <p:cNvPr id="38" name="TextBox 37">
+            <a:extLst>
+              <a:ext uri="{FF2B5EF4-FFF2-40B4-BE49-F238E27FC236}">
+                <a16:creationId xmlns:a16="http://schemas.microsoft.com/office/drawing/2014/main" id="{94254194-4B27-4E91-9BD4-30032CF00016}"/>
+              </a:ext>
+            </a:extLst>
+          </p:cNvPr>
+          <p:cNvSpPr txBox="1"/>
+          <p:nvPr/>
+        </p:nvSpPr>
+        <p:spPr>
+          <a:xfrm>
+            <a:off x="1431224" y="3277385"/>
+            <a:ext cx="3080171" cy="215444"/>
+          </a:xfrm>
+          <a:prstGeom prst="rect">
+            <a:avLst/>
+          </a:prstGeom>
+          <a:noFill/>
+        </p:spPr>
+        <p:txBody>
+          <a:bodyPr wrap="square" lIns="0" tIns="0" rIns="0" bIns="0" rtlCol="0">
+            <a:spAutoFit/>
+          </a:bodyPr>
+          <a:lstStyle/>
+          <a:p>
+            <a:r>
+              <a:rPr lang="en-US" sz="1400" dirty="0" err="1">
+                <a:solidFill>
+                  <a:srgbClr val="7030A0"/>
+                </a:solidFill>
+              </a:rPr>
+              <a:t>handleTemplateLoadingExceptionEvent</a:t>
+            </a:r>
+            <a:r>
+              <a:rPr lang="en-US" sz="1400" dirty="0">
+                <a:solidFill>
+                  <a:srgbClr val="7030A0"/>
+                </a:solidFill>
+              </a:rPr>
+              <a:t>()</a:t>
+            </a:r>
+          </a:p>
+        </p:txBody>
+      </p:sp>
+      <p:cxnSp>
+        <p:nvCxnSpPr>
+          <p:cNvPr id="39" name="Straight Arrow Connector 38">
+            <a:extLst>
+              <a:ext uri="{FF2B5EF4-FFF2-40B4-BE49-F238E27FC236}">
+                <a16:creationId xmlns:a16="http://schemas.microsoft.com/office/drawing/2014/main" id="{953AED3A-D303-423E-99AF-6CB5FC8E9AF3}"/>
+              </a:ext>
+            </a:extLst>
+          </p:cNvPr>
+          <p:cNvCxnSpPr/>
+          <p:nvPr/>
+        </p:nvCxnSpPr>
+        <p:spPr>
+          <a:xfrm flipH="1">
+            <a:off x="4542214" y="3364890"/>
+            <a:ext cx="3383941" cy="0"/>
+          </a:xfrm>
+          <a:prstGeom prst="straightConnector1">
+            <a:avLst/>
+          </a:prstGeom>
+          <a:ln w="19050">
+            <a:solidFill>
+              <a:schemeClr val="accent6">
+                <a:lumMod val="75000"/>
+              </a:schemeClr>
+            </a:solidFill>
+            <a:prstDash val="solid"/>
+            <a:headEnd type="none" w="med" len="med"/>
+            <a:tailEnd type="arrow" w="med" len="med"/>
+          </a:ln>
+        </p:spPr>
+        <p:style>
+          <a:lnRef idx="1">
+            <a:schemeClr val="accent1"/>
+          </a:lnRef>
+          <a:fillRef idx="0">
+            <a:schemeClr val="accent1"/>
+          </a:fillRef>
+          <a:effectRef idx="0">
+            <a:schemeClr val="accent1"/>
+          </a:effectRef>
+          <a:fontRef idx="minor">
+            <a:schemeClr val="tx1"/>
+          </a:fontRef>
+        </p:style>
+      </p:cxnSp>
+      <p:sp>
+        <p:nvSpPr>
+          <p:cNvPr id="40" name="TextBox 39">
+            <a:extLst>
+              <a:ext uri="{FF2B5EF4-FFF2-40B4-BE49-F238E27FC236}">
+                <a16:creationId xmlns:a16="http://schemas.microsoft.com/office/drawing/2014/main" id="{E98B4758-959C-4B8F-B8BF-BD2DCE764651}"/>
+              </a:ext>
+            </a:extLst>
+          </p:cNvPr>
+          <p:cNvSpPr txBox="1"/>
+          <p:nvPr/>
+        </p:nvSpPr>
+        <p:spPr>
+          <a:xfrm>
+            <a:off x="4719430" y="3358436"/>
+            <a:ext cx="2790772" cy="215444"/>
+          </a:xfrm>
+          <a:prstGeom prst="rect">
+            <a:avLst/>
+          </a:prstGeom>
+          <a:noFill/>
+        </p:spPr>
+        <p:txBody>
+          <a:bodyPr wrap="square" lIns="0" tIns="0" rIns="0" bIns="0" rtlCol="0">
+            <a:spAutoFit/>
+          </a:bodyPr>
+          <a:lstStyle/>
+          <a:p>
+            <a:r>
+              <a:rPr lang="en-US" sz="1400" dirty="0">
+                <a:solidFill>
+                  <a:schemeClr val="accent5">
+                    <a:lumMod val="75000"/>
+                  </a:schemeClr>
+                </a:solidFill>
+              </a:rPr>
+              <a:t>post(</a:t>
+            </a:r>
+            <a:r>
+              <a:rPr lang="en-US" sz="1400" dirty="0" err="1">
+                <a:solidFill>
+                  <a:schemeClr val="accent5">
+                    <a:lumMod val="75000"/>
+                  </a:schemeClr>
+                </a:solidFill>
+              </a:rPr>
+              <a:t>TemplateLoadingExceptionEvent</a:t>
+            </a:r>
+            <a:r>
+              <a:rPr lang="en-US" sz="1400" dirty="0">
+                <a:solidFill>
+                  <a:schemeClr val="accent5">
+                    <a:lumMod val="75000"/>
+                  </a:schemeClr>
+                </a:solidFill>
+              </a:rPr>
+              <a:t>)</a:t>
+            </a:r>
+          </a:p>
+        </p:txBody>
+      </p:sp>
+      <p:cxnSp>
+        <p:nvCxnSpPr>
+          <p:cNvPr id="42" name="Straight Connector 41">
+            <a:extLst>
+              <a:ext uri="{FF2B5EF4-FFF2-40B4-BE49-F238E27FC236}">
+                <a16:creationId xmlns:a16="http://schemas.microsoft.com/office/drawing/2014/main" id="{84C5296B-2F5A-4C08-AE55-02225278E9BA}"/>
+              </a:ext>
+            </a:extLst>
+          </p:cNvPr>
+          <p:cNvCxnSpPr>
+            <a:cxnSpLocks/>
+            <a:stCxn id="32" idx="1"/>
+            <a:endCxn id="32" idx="3"/>
+          </p:cNvCxnSpPr>
+          <p:nvPr/>
+        </p:nvCxnSpPr>
+        <p:spPr>
+          <a:xfrm>
+            <a:off x="729358" y="3055815"/>
+            <a:ext cx="7739281" cy="0"/>
+          </a:xfrm>
+          <a:prstGeom prst="line">
+            <a:avLst/>
+          </a:prstGeom>
+          <a:ln w="25400">
+            <a:solidFill>
+              <a:srgbClr val="FF0000"/>
+            </a:solidFill>
+          </a:ln>
+        </p:spPr>
+        <p:style>
+          <a:lnRef idx="1">
+            <a:schemeClr val="accent1"/>
+          </a:lnRef>
+          <a:fillRef idx="0">
+            <a:schemeClr val="accent1"/>
+          </a:fillRef>
+          <a:effectRef idx="0">
+            <a:schemeClr val="accent1"/>
+          </a:effectRef>
+          <a:fontRef idx="minor">
+            <a:schemeClr val="tx1"/>
+          </a:fontRef>
+        </p:style>
+      </p:cxnSp>
+      <p:sp>
+        <p:nvSpPr>
+          <p:cNvPr id="44" name="Rectangle 43">
+            <a:extLst>
+              <a:ext uri="{FF2B5EF4-FFF2-40B4-BE49-F238E27FC236}">
+                <a16:creationId xmlns:a16="http://schemas.microsoft.com/office/drawing/2014/main" id="{75978667-B4B1-40EB-81EE-0EF49312A268}"/>
+              </a:ext>
+            </a:extLst>
+          </p:cNvPr>
+          <p:cNvSpPr/>
+          <p:nvPr/>
+        </p:nvSpPr>
+        <p:spPr>
+          <a:xfrm>
+            <a:off x="4392448" y="3069539"/>
+            <a:ext cx="142006" cy="791886"/>
+          </a:xfrm>
+          <a:prstGeom prst="rect">
+            <a:avLst/>
+          </a:prstGeom>
+          <a:solidFill>
+            <a:schemeClr val="accent5">
+              <a:lumMod val="75000"/>
+            </a:schemeClr>
+          </a:solidFill>
+          <a:ln>
+            <a:solidFill>
+              <a:schemeClr val="accent5">
+                <a:lumMod val="75000"/>
+              </a:schemeClr>
+            </a:solidFill>
+          </a:ln>
+          <a:effectLst/>
+        </p:spPr>
+        <p:style>
+          <a:lnRef idx="1">
+            <a:schemeClr val="accent3"/>
+          </a:lnRef>
+          <a:fillRef idx="2">
+            <a:schemeClr val="accent3"/>
+          </a:fillRef>
+          <a:effectRef idx="1">
+            <a:schemeClr val="accent3"/>
+          </a:effectRef>
+          <a:fontRef idx="minor">
+            <a:schemeClr val="dk1"/>
+          </a:fontRef>
+        </p:style>
+        <p:txBody>
+          <a:bodyPr rtlCol="0" anchor="ctr"/>
+          <a:lstStyle/>
+          <a:p>
+            <a:pPr algn="ctr"/>
+            <a:endParaRPr lang="en-SG" sz="1400">
+              <a:solidFill>
+                <a:schemeClr val="dk1"/>
+              </a:solidFill>
+            </a:endParaRPr>
+          </a:p>
+        </p:txBody>
+      </p:sp>
+      <p:cxnSp>
+        <p:nvCxnSpPr>
+          <p:cNvPr id="45" name="Straight Arrow Connector 44">
+            <a:extLst>
+              <a:ext uri="{FF2B5EF4-FFF2-40B4-BE49-F238E27FC236}">
+                <a16:creationId xmlns:a16="http://schemas.microsoft.com/office/drawing/2014/main" id="{C22A5535-5CC0-461E-B4B6-233AB31ACFB8}"/>
+              </a:ext>
+            </a:extLst>
+          </p:cNvPr>
+          <p:cNvCxnSpPr/>
+          <p:nvPr/>
+        </p:nvCxnSpPr>
+        <p:spPr>
+          <a:xfrm flipH="1">
+            <a:off x="4542214" y="2663140"/>
+            <a:ext cx="3383941" cy="0"/>
+          </a:xfrm>
+          <a:prstGeom prst="straightConnector1">
+            <a:avLst/>
+          </a:prstGeom>
+          <a:ln w="19050">
+            <a:solidFill>
+              <a:schemeClr val="accent6">
+                <a:lumMod val="75000"/>
+              </a:schemeClr>
+            </a:solidFill>
+            <a:prstDash val="sysDash"/>
+            <a:headEnd type="none" w="med" len="med"/>
+            <a:tailEnd type="arrow" w="med" len="med"/>
+          </a:ln>
+        </p:spPr>
+        <p:style>
+          <a:lnRef idx="1">
+            <a:schemeClr val="accent1"/>
+          </a:lnRef>
+          <a:fillRef idx="0">
+            <a:schemeClr val="accent1"/>
+          </a:fillRef>
+          <a:effectRef idx="0">
+            <a:schemeClr val="accent1"/>
+          </a:effectRef>
+          <a:fontRef idx="minor">
+            <a:schemeClr val="tx1"/>
+          </a:fontRef>
+        </p:style>
+      </p:cxnSp>
+      <p:cxnSp>
+        <p:nvCxnSpPr>
+          <p:cNvPr id="46" name="Straight Arrow Connector 45">
+            <a:extLst>
+              <a:ext uri="{FF2B5EF4-FFF2-40B4-BE49-F238E27FC236}">
+                <a16:creationId xmlns:a16="http://schemas.microsoft.com/office/drawing/2014/main" id="{CF2E6B0E-695D-4090-9F32-EB42044AF939}"/>
+              </a:ext>
+            </a:extLst>
+          </p:cNvPr>
+          <p:cNvCxnSpPr>
+            <a:cxnSpLocks/>
+          </p:cNvCxnSpPr>
+          <p:nvPr/>
+        </p:nvCxnSpPr>
+        <p:spPr>
+          <a:xfrm>
+            <a:off x="1367340" y="3855130"/>
+            <a:ext cx="3051069" cy="0"/>
+          </a:xfrm>
+          <a:prstGeom prst="straightConnector1">
+            <a:avLst/>
+          </a:prstGeom>
+          <a:ln w="19050">
+            <a:solidFill>
+              <a:schemeClr val="accent5">
+                <a:lumMod val="75000"/>
+              </a:schemeClr>
+            </a:solidFill>
+            <a:prstDash val="sysDash"/>
+            <a:headEnd type="arrow" w="med" len="med"/>
+            <a:tailEnd type="none" w="med" len="med"/>
+          </a:ln>
+        </p:spPr>
+        <p:style>
+          <a:lnRef idx="1">
+            <a:schemeClr val="accent1"/>
+          </a:lnRef>
+          <a:fillRef idx="0">
+            <a:schemeClr val="accent1"/>
+          </a:fillRef>
+          <a:effectRef idx="0">
+            <a:schemeClr val="accent1"/>
+          </a:effectRef>
+          <a:fontRef idx="minor">
+            <a:schemeClr val="tx1"/>
+          </a:fontRef>
+        </p:style>
+      </p:cxnSp>
+      <p:cxnSp>
+        <p:nvCxnSpPr>
+          <p:cNvPr id="50" name="Straight Arrow Connector 49">
+            <a:extLst>
+              <a:ext uri="{FF2B5EF4-FFF2-40B4-BE49-F238E27FC236}">
+                <a16:creationId xmlns:a16="http://schemas.microsoft.com/office/drawing/2014/main" id="{46AB0DA5-47D9-4D37-A407-05E156FF13C1}"/>
+              </a:ext>
+            </a:extLst>
+          </p:cNvPr>
+          <p:cNvCxnSpPr>
+            <a:cxnSpLocks/>
+          </p:cNvCxnSpPr>
+          <p:nvPr/>
+        </p:nvCxnSpPr>
+        <p:spPr>
+          <a:xfrm>
+            <a:off x="729358" y="4258258"/>
+            <a:ext cx="470532" cy="0"/>
+          </a:xfrm>
+          <a:prstGeom prst="straightConnector1">
+            <a:avLst/>
+          </a:prstGeom>
+          <a:ln w="19050">
+            <a:solidFill>
+              <a:srgbClr val="7030A0"/>
+            </a:solidFill>
+            <a:prstDash val="sysDash"/>
+            <a:headEnd type="arrow" w="med" len="med"/>
+            <a:tailEnd type="none" w="med" len="med"/>
+          </a:ln>
+        </p:spPr>
+        <p:style>
+          <a:lnRef idx="1">
+            <a:schemeClr val="accent1"/>
+          </a:lnRef>
+          <a:fillRef idx="0">
+            <a:schemeClr val="accent1"/>
+          </a:fillRef>
+          <a:effectRef idx="0">
+            <a:schemeClr val="accent1"/>
+          </a:effectRef>
+          <a:fontRef idx="minor">
+            <a:schemeClr val="tx1"/>
+          </a:fontRef>
+        </p:style>
+      </p:cxnSp>
+      <p:sp>
+        <p:nvSpPr>
+          <p:cNvPr id="54" name="Rectangle: Single Corner Snipped 53">
+            <a:extLst>
+              <a:ext uri="{FF2B5EF4-FFF2-40B4-BE49-F238E27FC236}">
+                <a16:creationId xmlns:a16="http://schemas.microsoft.com/office/drawing/2014/main" id="{20BC8C22-DF1D-48F1-AC74-466C1306E1EE}"/>
+              </a:ext>
+            </a:extLst>
+          </p:cNvPr>
+          <p:cNvSpPr/>
+          <p:nvPr/>
+        </p:nvSpPr>
+        <p:spPr>
+          <a:xfrm flipV="1">
+            <a:off x="729358" y="2004548"/>
+            <a:ext cx="381001" cy="279488"/>
+          </a:xfrm>
+          <a:prstGeom prst="snip1Rect">
+            <a:avLst>
+              <a:gd name="adj" fmla="val 31397"/>
+            </a:avLst>
+          </a:prstGeom>
+          <a:noFill/>
+          <a:ln>
+            <a:solidFill>
+              <a:srgbClr val="FF0000"/>
+            </a:solidFill>
+          </a:ln>
+        </p:spPr>
+        <p:style>
+          <a:lnRef idx="2">
+            <a:schemeClr val="accent1">
+              <a:shade val="50000"/>
+            </a:schemeClr>
+          </a:lnRef>
+          <a:fillRef idx="1">
+            <a:schemeClr val="accent1"/>
+          </a:fillRef>
+          <a:effectRef idx="0">
+            <a:schemeClr val="accent1"/>
+          </a:effectRef>
+          <a:fontRef idx="minor">
+            <a:schemeClr val="lt1"/>
+          </a:fontRef>
+        </p:style>
+        <p:txBody>
+          <a:bodyPr vert="horz" rtlCol="0" anchor="ctr"/>
+          <a:lstStyle/>
+          <a:p>
+            <a:pPr algn="ctr"/>
+            <a:endParaRPr lang="en-SG" dirty="0">
+              <a:solidFill>
+                <a:schemeClr val="tx1"/>
+              </a:solidFill>
+            </a:endParaRPr>
+          </a:p>
+        </p:txBody>
+      </p:sp>
+      <p:sp>
+        <p:nvSpPr>
+          <p:cNvPr id="57" name="TextBox 56">
+            <a:extLst>
+              <a:ext uri="{FF2B5EF4-FFF2-40B4-BE49-F238E27FC236}">
+                <a16:creationId xmlns:a16="http://schemas.microsoft.com/office/drawing/2014/main" id="{25DAAE14-38DC-4530-9627-BC494A4EAA4A}"/>
+              </a:ext>
+            </a:extLst>
+          </p:cNvPr>
+          <p:cNvSpPr txBox="1"/>
+          <p:nvPr/>
+        </p:nvSpPr>
+        <p:spPr>
+          <a:xfrm>
+            <a:off x="720603" y="1981200"/>
+            <a:ext cx="415175" cy="307777"/>
+          </a:xfrm>
+          <a:prstGeom prst="rect">
+            <a:avLst/>
+          </a:prstGeom>
+          <a:noFill/>
+        </p:spPr>
+        <p:txBody>
+          <a:bodyPr wrap="square" rtlCol="0">
+            <a:spAutoFit/>
+          </a:bodyPr>
+          <a:lstStyle/>
+          <a:p>
+            <a:r>
+              <a:rPr lang="en-SG" sz="1400" dirty="0">
+                <a:solidFill>
+                  <a:srgbClr val="FF0000"/>
+                </a:solidFill>
+              </a:rPr>
+              <a:t>alt</a:t>
+            </a:r>
+          </a:p>
+        </p:txBody>
+      </p:sp>
+      <p:sp>
+        <p:nvSpPr>
+          <p:cNvPr id="58" name="TextBox 57">
+            <a:extLst>
+              <a:ext uri="{FF2B5EF4-FFF2-40B4-BE49-F238E27FC236}">
+                <a16:creationId xmlns:a16="http://schemas.microsoft.com/office/drawing/2014/main" id="{D69C604D-D44C-4895-8B46-BEC476206ACA}"/>
+              </a:ext>
+            </a:extLst>
+          </p:cNvPr>
+          <p:cNvSpPr txBox="1"/>
+          <p:nvPr/>
+        </p:nvSpPr>
+        <p:spPr>
+          <a:xfrm>
+            <a:off x="5615328" y="2041573"/>
+            <a:ext cx="2307381" cy="215444"/>
+          </a:xfrm>
+          <a:prstGeom prst="rect">
+            <a:avLst/>
+          </a:prstGeom>
+          <a:noFill/>
+        </p:spPr>
+        <p:txBody>
+          <a:bodyPr wrap="square" lIns="0" tIns="0" rIns="0" bIns="0" rtlCol="0">
+            <a:spAutoFit/>
+          </a:bodyPr>
+          <a:lstStyle/>
+          <a:p>
+            <a:r>
+              <a:rPr lang="en-US" sz="1400" dirty="0">
+                <a:solidFill>
+                  <a:srgbClr val="FF0000"/>
+                </a:solidFill>
+              </a:rPr>
+              <a:t>[template loaded successfully]</a:t>
+            </a:r>
+          </a:p>
+        </p:txBody>
+      </p:sp>
+      <p:sp>
+        <p:nvSpPr>
+          <p:cNvPr id="60" name="TextBox 59">
+            <a:extLst>
+              <a:ext uri="{FF2B5EF4-FFF2-40B4-BE49-F238E27FC236}">
+                <a16:creationId xmlns:a16="http://schemas.microsoft.com/office/drawing/2014/main" id="{D9B65055-81CD-4863-BDE3-41E8263C8959}"/>
+              </a:ext>
+            </a:extLst>
+          </p:cNvPr>
+          <p:cNvSpPr txBox="1"/>
+          <p:nvPr/>
+        </p:nvSpPr>
+        <p:spPr>
+          <a:xfrm>
+            <a:off x="5220714" y="3089144"/>
+            <a:ext cx="2606336" cy="215444"/>
+          </a:xfrm>
+          <a:prstGeom prst="rect">
+            <a:avLst/>
+          </a:prstGeom>
+          <a:noFill/>
+        </p:spPr>
+        <p:txBody>
+          <a:bodyPr wrap="square" lIns="0" tIns="0" rIns="0" bIns="0" rtlCol="0">
+            <a:spAutoFit/>
+          </a:bodyPr>
+          <a:lstStyle/>
+          <a:p>
+            <a:r>
+              <a:rPr lang="en-US" sz="1400" dirty="0">
+                <a:solidFill>
+                  <a:srgbClr val="FF0000"/>
+                </a:solidFill>
+              </a:rPr>
+              <a:t>[exception during template loading]</a:t>
+            </a:r>
           </a:p>
         </p:txBody>
       </p:sp>
     </p:spTree>
     <p:extLst>
       <p:ext uri="{BB962C8B-B14F-4D97-AF65-F5344CB8AC3E}">
-        <p14:creationId xmlns:p14="http://schemas.microsoft.com/office/powerpoint/2010/main" val="4023378879"/>
+        <p14:creationId xmlns:p14="http://schemas.microsoft.com/office/powerpoint/2010/main" val="565728835"/>
       </p:ext>
     </p:extLst>
   </p:cSld>

</xml_diff>

<commit_message>
Modify sequence diagram (#294)
</commit_message>
<xml_diff>
--- a/docs/diagrams/HighLevelSequenceDiagrams.pptx
+++ b/docs/diagrams/HighLevelSequenceDiagrams.pptx
@@ -225,7 +225,7 @@
           <a:p>
             <a:fld id="{F5CC4B3F-88C1-4FFA-B1B6-F41C21DC6924}" type="datetimeFigureOut">
               <a:rPr lang="en-US" smtClean="0"/>
-              <a:t>11/1/2018</a:t>
+              <a:t>11/9/2018</a:t>
             </a:fld>
             <a:endParaRPr lang="en-US"/>
           </a:p>
@@ -671,7 +671,7 @@
           <a:p>
             <a:fld id="{78C97017-6FC3-485B-9764-EAC9E56C1D49}" type="datetimeFigureOut">
               <a:rPr lang="en-US" smtClean="0"/>
-              <a:t>11/1/2018</a:t>
+              <a:t>11/9/2018</a:t>
             </a:fld>
             <a:endParaRPr lang="en-US"/>
           </a:p>
@@ -839,7 +839,7 @@
           <a:p>
             <a:fld id="{78C97017-6FC3-485B-9764-EAC9E56C1D49}" type="datetimeFigureOut">
               <a:rPr lang="en-US" smtClean="0"/>
-              <a:t>11/1/2018</a:t>
+              <a:t>11/9/2018</a:t>
             </a:fld>
             <a:endParaRPr lang="en-US"/>
           </a:p>
@@ -1017,7 +1017,7 @@
           <a:p>
             <a:fld id="{78C97017-6FC3-485B-9764-EAC9E56C1D49}" type="datetimeFigureOut">
               <a:rPr lang="en-US" smtClean="0"/>
-              <a:t>11/1/2018</a:t>
+              <a:t>11/9/2018</a:t>
             </a:fld>
             <a:endParaRPr lang="en-US"/>
           </a:p>
@@ -1185,7 +1185,7 @@
           <a:p>
             <a:fld id="{78C97017-6FC3-485B-9764-EAC9E56C1D49}" type="datetimeFigureOut">
               <a:rPr lang="en-US" smtClean="0"/>
-              <a:t>11/1/2018</a:t>
+              <a:t>11/9/2018</a:t>
             </a:fld>
             <a:endParaRPr lang="en-US"/>
           </a:p>
@@ -1430,7 +1430,7 @@
           <a:p>
             <a:fld id="{78C97017-6FC3-485B-9764-EAC9E56C1D49}" type="datetimeFigureOut">
               <a:rPr lang="en-US" smtClean="0"/>
-              <a:t>11/1/2018</a:t>
+              <a:t>11/9/2018</a:t>
             </a:fld>
             <a:endParaRPr lang="en-US"/>
           </a:p>
@@ -1715,7 +1715,7 @@
           <a:p>
             <a:fld id="{78C97017-6FC3-485B-9764-EAC9E56C1D49}" type="datetimeFigureOut">
               <a:rPr lang="en-US" smtClean="0"/>
-              <a:t>11/1/2018</a:t>
+              <a:t>11/9/2018</a:t>
             </a:fld>
             <a:endParaRPr lang="en-US"/>
           </a:p>
@@ -2134,7 +2134,7 @@
           <a:p>
             <a:fld id="{78C97017-6FC3-485B-9764-EAC9E56C1D49}" type="datetimeFigureOut">
               <a:rPr lang="en-US" smtClean="0"/>
-              <a:t>11/1/2018</a:t>
+              <a:t>11/9/2018</a:t>
             </a:fld>
             <a:endParaRPr lang="en-US"/>
           </a:p>
@@ -2251,7 +2251,7 @@
           <a:p>
             <a:fld id="{78C97017-6FC3-485B-9764-EAC9E56C1D49}" type="datetimeFigureOut">
               <a:rPr lang="en-US" smtClean="0"/>
-              <a:t>11/1/2018</a:t>
+              <a:t>11/9/2018</a:t>
             </a:fld>
             <a:endParaRPr lang="en-US"/>
           </a:p>
@@ -2346,7 +2346,7 @@
           <a:p>
             <a:fld id="{78C97017-6FC3-485B-9764-EAC9E56C1D49}" type="datetimeFigureOut">
               <a:rPr lang="en-US" smtClean="0"/>
-              <a:t>11/1/2018</a:t>
+              <a:t>11/9/2018</a:t>
             </a:fld>
             <a:endParaRPr lang="en-US"/>
           </a:p>
@@ -2621,7 +2621,7 @@
           <a:p>
             <a:fld id="{78C97017-6FC3-485B-9764-EAC9E56C1D49}" type="datetimeFigureOut">
               <a:rPr lang="en-US" smtClean="0"/>
-              <a:t>11/1/2018</a:t>
+              <a:t>11/9/2018</a:t>
             </a:fld>
             <a:endParaRPr lang="en-US"/>
           </a:p>
@@ -2873,7 +2873,7 @@
           <a:p>
             <a:fld id="{78C97017-6FC3-485B-9764-EAC9E56C1D49}" type="datetimeFigureOut">
               <a:rPr lang="en-US" smtClean="0"/>
-              <a:t>11/1/2018</a:t>
+              <a:t>11/9/2018</a:t>
             </a:fld>
             <a:endParaRPr lang="en-US"/>
           </a:p>
@@ -3084,7 +3084,7 @@
           <a:p>
             <a:fld id="{78C97017-6FC3-485B-9764-EAC9E56C1D49}" type="datetimeFigureOut">
               <a:rPr lang="en-US" smtClean="0"/>
-              <a:t>11/1/2018</a:t>
+              <a:t>11/9/2018</a:t>
             </a:fld>
             <a:endParaRPr lang="en-US"/>
           </a:p>
@@ -11848,8 +11848,8 @@
         </p:nvSpPr>
         <p:spPr>
           <a:xfrm>
-            <a:off x="4351585" y="1782838"/>
-            <a:ext cx="119777" cy="4541095"/>
+            <a:off x="4361666" y="1878783"/>
+            <a:ext cx="106372" cy="1052114"/>
           </a:xfrm>
           <a:prstGeom prst="rect">
             <a:avLst/>
@@ -11909,7 +11909,7 @@
         </p:nvCxnSpPr>
         <p:spPr>
           <a:xfrm>
-            <a:off x="2998567" y="1962111"/>
+            <a:off x="3093163" y="1878783"/>
             <a:ext cx="1295400" cy="0"/>
           </a:xfrm>
           <a:prstGeom prst="straightConnector1">
@@ -11953,8 +11953,8 @@
         </p:nvCxnSpPr>
         <p:spPr>
           <a:xfrm>
-            <a:off x="1313009" y="2896455"/>
-            <a:ext cx="3075554" cy="0"/>
+            <a:off x="2998567" y="2896455"/>
+            <a:ext cx="1389996" cy="0"/>
           </a:xfrm>
           <a:prstGeom prst="straightConnector1">
             <a:avLst/>
@@ -13381,8 +13381,8 @@
         </p:nvCxnSpPr>
         <p:spPr>
           <a:xfrm>
-            <a:off x="1313009" y="4648200"/>
-            <a:ext cx="3075554" cy="0"/>
+            <a:off x="3060575" y="4648200"/>
+            <a:ext cx="1327988" cy="0"/>
           </a:xfrm>
           <a:prstGeom prst="straightConnector1">
             <a:avLst/>
@@ -13756,8 +13756,8 @@
         </p:nvCxnSpPr>
         <p:spPr>
           <a:xfrm>
-            <a:off x="1344338" y="6248397"/>
-            <a:ext cx="3075554" cy="0"/>
+            <a:off x="3200400" y="6377818"/>
+            <a:ext cx="1219492" cy="0"/>
           </a:xfrm>
           <a:prstGeom prst="straightConnector1">
             <a:avLst/>
@@ -13865,6 +13865,128 @@
               </a:rPr>
               <a:t>Update expanded entry panel</a:t>
             </a:r>
+          </a:p>
+        </p:txBody>
+      </p:sp>
+      <p:sp>
+        <p:nvSpPr>
+          <p:cNvPr id="52" name="Rectangle 51">
+            <a:extLst>
+              <a:ext uri="{FF2B5EF4-FFF2-40B4-BE49-F238E27FC236}">
+                <a16:creationId xmlns:a16="http://schemas.microsoft.com/office/drawing/2014/main" id="{0B5D84B4-688A-40CC-A24C-015A975EAA49}"/>
+              </a:ext>
+            </a:extLst>
+          </p:cNvPr>
+          <p:cNvSpPr/>
+          <p:nvPr/>
+        </p:nvSpPr>
+        <p:spPr>
+          <a:xfrm>
+            <a:off x="4355975" y="3478792"/>
+            <a:ext cx="116452" cy="1148058"/>
+          </a:xfrm>
+          <a:prstGeom prst="rect">
+            <a:avLst/>
+          </a:prstGeom>
+          <a:solidFill>
+            <a:schemeClr val="accent5">
+              <a:lumMod val="75000"/>
+            </a:schemeClr>
+          </a:solidFill>
+          <a:ln>
+            <a:solidFill>
+              <a:schemeClr val="accent5">
+                <a:lumMod val="75000"/>
+              </a:schemeClr>
+            </a:solidFill>
+          </a:ln>
+          <a:effectLst/>
+        </p:spPr>
+        <p:style>
+          <a:lnRef idx="1">
+            <a:schemeClr val="accent3"/>
+          </a:lnRef>
+          <a:fillRef idx="2">
+            <a:schemeClr val="accent3"/>
+          </a:fillRef>
+          <a:effectRef idx="1">
+            <a:schemeClr val="accent3"/>
+          </a:effectRef>
+          <a:fontRef idx="minor">
+            <a:schemeClr val="dk1"/>
+          </a:fontRef>
+        </p:style>
+        <p:txBody>
+          <a:bodyPr rtlCol="0" anchor="ctr"/>
+          <a:lstStyle/>
+          <a:p>
+            <a:pPr algn="ctr"/>
+            <a:endParaRPr lang="en-SG" sz="1400">
+              <a:solidFill>
+                <a:schemeClr val="dk1"/>
+              </a:solidFill>
+            </a:endParaRPr>
+          </a:p>
+        </p:txBody>
+      </p:sp>
+      <p:sp>
+        <p:nvSpPr>
+          <p:cNvPr id="53" name="Rectangle 52">
+            <a:extLst>
+              <a:ext uri="{FF2B5EF4-FFF2-40B4-BE49-F238E27FC236}">
+                <a16:creationId xmlns:a16="http://schemas.microsoft.com/office/drawing/2014/main" id="{5F7F0D89-0E77-40A4-A74D-FCE36C0EEBC6}"/>
+              </a:ext>
+            </a:extLst>
+          </p:cNvPr>
+          <p:cNvSpPr/>
+          <p:nvPr/>
+        </p:nvSpPr>
+        <p:spPr>
+          <a:xfrm>
+            <a:off x="4371744" y="5325703"/>
+            <a:ext cx="106373" cy="1052115"/>
+          </a:xfrm>
+          <a:prstGeom prst="rect">
+            <a:avLst/>
+          </a:prstGeom>
+          <a:solidFill>
+            <a:schemeClr val="accent5">
+              <a:lumMod val="75000"/>
+            </a:schemeClr>
+          </a:solidFill>
+          <a:ln>
+            <a:solidFill>
+              <a:schemeClr val="accent5">
+                <a:lumMod val="75000"/>
+              </a:schemeClr>
+            </a:solidFill>
+          </a:ln>
+          <a:effectLst/>
+        </p:spPr>
+        <p:style>
+          <a:lnRef idx="1">
+            <a:schemeClr val="accent3"/>
+          </a:lnRef>
+          <a:fillRef idx="2">
+            <a:schemeClr val="accent3"/>
+          </a:fillRef>
+          <a:effectRef idx="1">
+            <a:schemeClr val="accent3"/>
+          </a:effectRef>
+          <a:fontRef idx="minor">
+            <a:schemeClr val="dk1"/>
+          </a:fontRef>
+        </p:style>
+        <p:txBody>
+          <a:bodyPr rtlCol="0" anchor="ctr"/>
+          <a:lstStyle/>
+          <a:p>
+            <a:pPr algn="ctr"/>
+            <a:endParaRPr lang="en-SG" sz="1400">
+              <a:solidFill>
+                <a:schemeClr val="dk1"/>
+              </a:solidFill>
+            </a:endParaRPr>
           </a:p>
         </p:txBody>
       </p:sp>

</xml_diff>